<commit_message>
Worked on first two columns
</commit_message>
<xml_diff>
--- a/reports/splash_poster/working_copy.pptx
+++ b/reports/splash_poster/working_copy.pptx
@@ -5,9 +5,9 @@
     <p:sldMasterId id="2147483648" r:id="rId1"/>
   </p:sldMasterIdLst>
   <p:sldIdLst>
-    <p:sldId id="256" r:id="rId7"/>
+    <p:sldId id="256" r:id="rId2"/>
   </p:sldIdLst>
-  <p:sldSz cx="36000000" cy="36000000" type="screen4x3"/>
+  <p:sldSz cx="35999738" cy="35999738"/>
   <p:notesSz cx="6858000" cy="9144000"/>
   <p:defaultTextStyle>
     <a:defPPr>
@@ -104,6 +104,22 @@
       </a:defRPr>
     </a:lvl9pPr>
   </p:defaultTextStyle>
+  <p:extLst>
+    <p:ext uri="{EFAFB233-063F-42B5-8137-9DF3F51BA10A}">
+      <p15:sldGuideLst xmlns:p15="http://schemas.microsoft.com/office/powerpoint/2012/main">
+        <p15:guide id="1" orient="horz" pos="2160">
+          <p15:clr>
+            <a:srgbClr val="A4A3A4"/>
+          </p15:clr>
+        </p15:guide>
+        <p15:guide id="2" pos="2880">
+          <p15:clr>
+            <a:srgbClr val="A4A3A4"/>
+          </p15:clr>
+        </p15:guide>
+      </p15:sldGuideLst>
+    </p:ext>
+  </p:extLst>
 </p:presentation>
 </file>
 
@@ -145,10 +161,9 @@
           <a:lstStyle/>
           <a:p>
             <a:r>
-              <a:rPr lang="en-US" smtClean="0"/>
+              <a:rPr lang="en-US"/>
               <a:t>Click to edit Master title style</a:t>
             </a:r>
-            <a:endParaRPr lang="en-US"/>
           </a:p>
         </p:txBody>
       </p:sp>
@@ -264,10 +279,9 @@
           </a:lstStyle>
           <a:p>
             <a:r>
-              <a:rPr lang="en-US" smtClean="0"/>
+              <a:rPr lang="en-US"/>
               <a:t>Click to edit Master subtitle style</a:t>
             </a:r>
-            <a:endParaRPr lang="en-US"/>
           </a:p>
         </p:txBody>
       </p:sp>
@@ -288,7 +302,7 @@
           <a:p>
             <a:fld id="{5BCAD085-E8A6-8845-BD4E-CB4CCA059FC4}" type="datetimeFigureOut">
               <a:rPr lang="en-US" smtClean="0"/>
-              <a:t>1/27/13</a:t>
+              <a:t>9/16/2025</a:t>
             </a:fld>
             <a:endParaRPr lang="en-US"/>
           </a:p>
@@ -382,10 +396,9 @@
           <a:lstStyle/>
           <a:p>
             <a:r>
-              <a:rPr lang="en-US" smtClean="0"/>
+              <a:rPr lang="en-US"/>
               <a:t>Click to edit Master title style</a:t>
             </a:r>
-            <a:endParaRPr lang="en-US"/>
           </a:p>
         </p:txBody>
       </p:sp>
@@ -406,38 +419,37 @@
           <a:p>
             <a:pPr lvl="0"/>
             <a:r>
-              <a:rPr lang="en-US" smtClean="0"/>
+              <a:rPr lang="en-US"/>
               <a:t>Click to edit Master text styles</a:t>
             </a:r>
           </a:p>
           <a:p>
             <a:pPr lvl="1"/>
             <a:r>
-              <a:rPr lang="en-US" smtClean="0"/>
+              <a:rPr lang="en-US"/>
               <a:t>Second level</a:t>
             </a:r>
           </a:p>
           <a:p>
             <a:pPr lvl="2"/>
             <a:r>
-              <a:rPr lang="en-US" smtClean="0"/>
+              <a:rPr lang="en-US"/>
               <a:t>Third level</a:t>
             </a:r>
           </a:p>
           <a:p>
             <a:pPr lvl="3"/>
             <a:r>
-              <a:rPr lang="en-US" smtClean="0"/>
+              <a:rPr lang="en-US"/>
               <a:t>Fourth level</a:t>
             </a:r>
           </a:p>
           <a:p>
             <a:pPr lvl="4"/>
             <a:r>
-              <a:rPr lang="en-US" smtClean="0"/>
+              <a:rPr lang="en-US"/>
               <a:t>Fifth level</a:t>
             </a:r>
-            <a:endParaRPr lang="en-US"/>
           </a:p>
         </p:txBody>
       </p:sp>
@@ -458,7 +470,7 @@
           <a:p>
             <a:fld id="{5BCAD085-E8A6-8845-BD4E-CB4CCA059FC4}" type="datetimeFigureOut">
               <a:rPr lang="en-US" smtClean="0"/>
-              <a:t>1/27/13</a:t>
+              <a:t>9/16/2025</a:t>
             </a:fld>
             <a:endParaRPr lang="en-US"/>
           </a:p>
@@ -557,10 +569,9 @@
           <a:lstStyle/>
           <a:p>
             <a:r>
-              <a:rPr lang="en-US" smtClean="0"/>
+              <a:rPr lang="en-US"/>
               <a:t>Click to edit Master title style</a:t>
             </a:r>
-            <a:endParaRPr lang="en-US"/>
           </a:p>
         </p:txBody>
       </p:sp>
@@ -586,38 +597,37 @@
           <a:p>
             <a:pPr lvl="0"/>
             <a:r>
-              <a:rPr lang="en-US" smtClean="0"/>
+              <a:rPr lang="en-US"/>
               <a:t>Click to edit Master text styles</a:t>
             </a:r>
           </a:p>
           <a:p>
             <a:pPr lvl="1"/>
             <a:r>
-              <a:rPr lang="en-US" smtClean="0"/>
+              <a:rPr lang="en-US"/>
               <a:t>Second level</a:t>
             </a:r>
           </a:p>
           <a:p>
             <a:pPr lvl="2"/>
             <a:r>
-              <a:rPr lang="en-US" smtClean="0"/>
+              <a:rPr lang="en-US"/>
               <a:t>Third level</a:t>
             </a:r>
           </a:p>
           <a:p>
             <a:pPr lvl="3"/>
             <a:r>
-              <a:rPr lang="en-US" smtClean="0"/>
+              <a:rPr lang="en-US"/>
               <a:t>Fourth level</a:t>
             </a:r>
           </a:p>
           <a:p>
             <a:pPr lvl="4"/>
             <a:r>
-              <a:rPr lang="en-US" smtClean="0"/>
+              <a:rPr lang="en-US"/>
               <a:t>Fifth level</a:t>
             </a:r>
-            <a:endParaRPr lang="en-US"/>
           </a:p>
         </p:txBody>
       </p:sp>
@@ -638,7 +648,7 @@
           <a:p>
             <a:fld id="{5BCAD085-E8A6-8845-BD4E-CB4CCA059FC4}" type="datetimeFigureOut">
               <a:rPr lang="en-US" smtClean="0"/>
-              <a:t>1/27/13</a:t>
+              <a:t>9/16/2025</a:t>
             </a:fld>
             <a:endParaRPr lang="en-US"/>
           </a:p>
@@ -732,10 +742,9 @@
           <a:lstStyle/>
           <a:p>
             <a:r>
-              <a:rPr lang="en-US" smtClean="0"/>
+              <a:rPr lang="en-US"/>
               <a:t>Click to edit Master title style</a:t>
             </a:r>
-            <a:endParaRPr lang="en-US"/>
           </a:p>
         </p:txBody>
       </p:sp>
@@ -756,38 +765,37 @@
           <a:p>
             <a:pPr lvl="0"/>
             <a:r>
-              <a:rPr lang="en-US" smtClean="0"/>
+              <a:rPr lang="en-US"/>
               <a:t>Click to edit Master text styles</a:t>
             </a:r>
           </a:p>
           <a:p>
             <a:pPr lvl="1"/>
             <a:r>
-              <a:rPr lang="en-US" smtClean="0"/>
+              <a:rPr lang="en-US"/>
               <a:t>Second level</a:t>
             </a:r>
           </a:p>
           <a:p>
             <a:pPr lvl="2"/>
             <a:r>
-              <a:rPr lang="en-US" smtClean="0"/>
+              <a:rPr lang="en-US"/>
               <a:t>Third level</a:t>
             </a:r>
           </a:p>
           <a:p>
             <a:pPr lvl="3"/>
             <a:r>
-              <a:rPr lang="en-US" smtClean="0"/>
+              <a:rPr lang="en-US"/>
               <a:t>Fourth level</a:t>
             </a:r>
           </a:p>
           <a:p>
             <a:pPr lvl="4"/>
             <a:r>
-              <a:rPr lang="en-US" smtClean="0"/>
+              <a:rPr lang="en-US"/>
               <a:t>Fifth level</a:t>
             </a:r>
-            <a:endParaRPr lang="en-US"/>
           </a:p>
         </p:txBody>
       </p:sp>
@@ -808,7 +816,7 @@
           <a:p>
             <a:fld id="{5BCAD085-E8A6-8845-BD4E-CB4CCA059FC4}" type="datetimeFigureOut">
               <a:rPr lang="en-US" smtClean="0"/>
-              <a:t>1/27/13</a:t>
+              <a:t>9/16/2025</a:t>
             </a:fld>
             <a:endParaRPr lang="en-US"/>
           </a:p>
@@ -911,10 +919,9 @@
           </a:lstStyle>
           <a:p>
             <a:r>
-              <a:rPr lang="en-US" smtClean="0"/>
+              <a:rPr lang="en-US"/>
               <a:t>Click to edit Master title style</a:t>
             </a:r>
-            <a:endParaRPr lang="en-US"/>
           </a:p>
         </p:txBody>
       </p:sp>
@@ -1031,7 +1038,7 @@
           <a:p>
             <a:pPr lvl="0"/>
             <a:r>
-              <a:rPr lang="en-US" smtClean="0"/>
+              <a:rPr lang="en-US"/>
               <a:t>Click to edit Master text styles</a:t>
             </a:r>
           </a:p>
@@ -1054,7 +1061,7 @@
           <a:p>
             <a:fld id="{5BCAD085-E8A6-8845-BD4E-CB4CCA059FC4}" type="datetimeFigureOut">
               <a:rPr lang="en-US" smtClean="0"/>
-              <a:t>1/27/13</a:t>
+              <a:t>9/16/2025</a:t>
             </a:fld>
             <a:endParaRPr lang="en-US"/>
           </a:p>
@@ -1148,10 +1155,9 @@
           <a:lstStyle/>
           <a:p>
             <a:r>
-              <a:rPr lang="en-US" smtClean="0"/>
+              <a:rPr lang="en-US"/>
               <a:t>Click to edit Master title style</a:t>
             </a:r>
-            <a:endParaRPr lang="en-US"/>
           </a:p>
         </p:txBody>
       </p:sp>
@@ -1205,38 +1211,37 @@
           <a:p>
             <a:pPr lvl="0"/>
             <a:r>
-              <a:rPr lang="en-US" smtClean="0"/>
+              <a:rPr lang="en-US"/>
               <a:t>Click to edit Master text styles</a:t>
             </a:r>
           </a:p>
           <a:p>
             <a:pPr lvl="1"/>
             <a:r>
-              <a:rPr lang="en-US" smtClean="0"/>
+              <a:rPr lang="en-US"/>
               <a:t>Second level</a:t>
             </a:r>
           </a:p>
           <a:p>
             <a:pPr lvl="2"/>
             <a:r>
-              <a:rPr lang="en-US" smtClean="0"/>
+              <a:rPr lang="en-US"/>
               <a:t>Third level</a:t>
             </a:r>
           </a:p>
           <a:p>
             <a:pPr lvl="3"/>
             <a:r>
-              <a:rPr lang="en-US" smtClean="0"/>
+              <a:rPr lang="en-US"/>
               <a:t>Fourth level</a:t>
             </a:r>
           </a:p>
           <a:p>
             <a:pPr lvl="4"/>
             <a:r>
-              <a:rPr lang="en-US" smtClean="0"/>
+              <a:rPr lang="en-US"/>
               <a:t>Fifth level</a:t>
             </a:r>
-            <a:endParaRPr lang="en-US"/>
           </a:p>
         </p:txBody>
       </p:sp>
@@ -1290,38 +1295,37 @@
           <a:p>
             <a:pPr lvl="0"/>
             <a:r>
-              <a:rPr lang="en-US" smtClean="0"/>
+              <a:rPr lang="en-US"/>
               <a:t>Click to edit Master text styles</a:t>
             </a:r>
           </a:p>
           <a:p>
             <a:pPr lvl="1"/>
             <a:r>
-              <a:rPr lang="en-US" smtClean="0"/>
+              <a:rPr lang="en-US"/>
               <a:t>Second level</a:t>
             </a:r>
           </a:p>
           <a:p>
             <a:pPr lvl="2"/>
             <a:r>
-              <a:rPr lang="en-US" smtClean="0"/>
+              <a:rPr lang="en-US"/>
               <a:t>Third level</a:t>
             </a:r>
           </a:p>
           <a:p>
             <a:pPr lvl="3"/>
             <a:r>
-              <a:rPr lang="en-US" smtClean="0"/>
+              <a:rPr lang="en-US"/>
               <a:t>Fourth level</a:t>
             </a:r>
           </a:p>
           <a:p>
             <a:pPr lvl="4"/>
             <a:r>
-              <a:rPr lang="en-US" smtClean="0"/>
+              <a:rPr lang="en-US"/>
               <a:t>Fifth level</a:t>
             </a:r>
-            <a:endParaRPr lang="en-US"/>
           </a:p>
         </p:txBody>
       </p:sp>
@@ -1342,7 +1346,7 @@
           <a:p>
             <a:fld id="{5BCAD085-E8A6-8845-BD4E-CB4CCA059FC4}" type="datetimeFigureOut">
               <a:rPr lang="en-US" smtClean="0"/>
-              <a:t>1/27/13</a:t>
+              <a:t>9/16/2025</a:t>
             </a:fld>
             <a:endParaRPr lang="en-US"/>
           </a:p>
@@ -1440,10 +1444,9 @@
           </a:lstStyle>
           <a:p>
             <a:r>
-              <a:rPr lang="en-US" smtClean="0"/>
+              <a:rPr lang="en-US"/>
               <a:t>Click to edit Master title style</a:t>
             </a:r>
-            <a:endParaRPr lang="en-US"/>
           </a:p>
         </p:txBody>
       </p:sp>
@@ -1506,7 +1509,7 @@
           <a:p>
             <a:pPr lvl="0"/>
             <a:r>
-              <a:rPr lang="en-US" smtClean="0"/>
+              <a:rPr lang="en-US"/>
               <a:t>Click to edit Master text styles</a:t>
             </a:r>
           </a:p>
@@ -1562,38 +1565,37 @@
           <a:p>
             <a:pPr lvl="0"/>
             <a:r>
-              <a:rPr lang="en-US" smtClean="0"/>
+              <a:rPr lang="en-US"/>
               <a:t>Click to edit Master text styles</a:t>
             </a:r>
           </a:p>
           <a:p>
             <a:pPr lvl="1"/>
             <a:r>
-              <a:rPr lang="en-US" smtClean="0"/>
+              <a:rPr lang="en-US"/>
               <a:t>Second level</a:t>
             </a:r>
           </a:p>
           <a:p>
             <a:pPr lvl="2"/>
             <a:r>
-              <a:rPr lang="en-US" smtClean="0"/>
+              <a:rPr lang="en-US"/>
               <a:t>Third level</a:t>
             </a:r>
           </a:p>
           <a:p>
             <a:pPr lvl="3"/>
             <a:r>
-              <a:rPr lang="en-US" smtClean="0"/>
+              <a:rPr lang="en-US"/>
               <a:t>Fourth level</a:t>
             </a:r>
           </a:p>
           <a:p>
             <a:pPr lvl="4"/>
             <a:r>
-              <a:rPr lang="en-US" smtClean="0"/>
+              <a:rPr lang="en-US"/>
               <a:t>Fifth level</a:t>
             </a:r>
-            <a:endParaRPr lang="en-US"/>
           </a:p>
         </p:txBody>
       </p:sp>
@@ -1656,7 +1658,7 @@
           <a:p>
             <a:pPr lvl="0"/>
             <a:r>
-              <a:rPr lang="en-US" smtClean="0"/>
+              <a:rPr lang="en-US"/>
               <a:t>Click to edit Master text styles</a:t>
             </a:r>
           </a:p>
@@ -1712,38 +1714,37 @@
           <a:p>
             <a:pPr lvl="0"/>
             <a:r>
-              <a:rPr lang="en-US" smtClean="0"/>
+              <a:rPr lang="en-US"/>
               <a:t>Click to edit Master text styles</a:t>
             </a:r>
           </a:p>
           <a:p>
             <a:pPr lvl="1"/>
             <a:r>
-              <a:rPr lang="en-US" smtClean="0"/>
+              <a:rPr lang="en-US"/>
               <a:t>Second level</a:t>
             </a:r>
           </a:p>
           <a:p>
             <a:pPr lvl="2"/>
             <a:r>
-              <a:rPr lang="en-US" smtClean="0"/>
+              <a:rPr lang="en-US"/>
               <a:t>Third level</a:t>
             </a:r>
           </a:p>
           <a:p>
             <a:pPr lvl="3"/>
             <a:r>
-              <a:rPr lang="en-US" smtClean="0"/>
+              <a:rPr lang="en-US"/>
               <a:t>Fourth level</a:t>
             </a:r>
           </a:p>
           <a:p>
             <a:pPr lvl="4"/>
             <a:r>
-              <a:rPr lang="en-US" smtClean="0"/>
+              <a:rPr lang="en-US"/>
               <a:t>Fifth level</a:t>
             </a:r>
-            <a:endParaRPr lang="en-US"/>
           </a:p>
         </p:txBody>
       </p:sp>
@@ -1764,7 +1765,7 @@
           <a:p>
             <a:fld id="{5BCAD085-E8A6-8845-BD4E-CB4CCA059FC4}" type="datetimeFigureOut">
               <a:rPr lang="en-US" smtClean="0"/>
-              <a:t>1/27/13</a:t>
+              <a:t>9/16/2025</a:t>
             </a:fld>
             <a:endParaRPr lang="en-US"/>
           </a:p>
@@ -1858,10 +1859,9 @@
           <a:lstStyle/>
           <a:p>
             <a:r>
-              <a:rPr lang="en-US" smtClean="0"/>
+              <a:rPr lang="en-US"/>
               <a:t>Click to edit Master title style</a:t>
             </a:r>
-            <a:endParaRPr lang="en-US"/>
           </a:p>
         </p:txBody>
       </p:sp>
@@ -1882,7 +1882,7 @@
           <a:p>
             <a:fld id="{5BCAD085-E8A6-8845-BD4E-CB4CCA059FC4}" type="datetimeFigureOut">
               <a:rPr lang="en-US" smtClean="0"/>
-              <a:t>1/27/13</a:t>
+              <a:t>9/16/2025</a:t>
             </a:fld>
             <a:endParaRPr lang="en-US"/>
           </a:p>
@@ -1977,7 +1977,7 @@
           <a:p>
             <a:fld id="{5BCAD085-E8A6-8845-BD4E-CB4CCA059FC4}" type="datetimeFigureOut">
               <a:rPr lang="en-US" smtClean="0"/>
-              <a:t>1/27/13</a:t>
+              <a:t>9/16/2025</a:t>
             </a:fld>
             <a:endParaRPr lang="en-US"/>
           </a:p>
@@ -2080,10 +2080,9 @@
           </a:lstStyle>
           <a:p>
             <a:r>
-              <a:rPr lang="en-US" smtClean="0"/>
+              <a:rPr lang="en-US"/>
               <a:t>Click to edit Master title style</a:t>
             </a:r>
-            <a:endParaRPr lang="en-US"/>
           </a:p>
         </p:txBody>
       </p:sp>
@@ -2137,38 +2136,37 @@
           <a:p>
             <a:pPr lvl="0"/>
             <a:r>
-              <a:rPr lang="en-US" smtClean="0"/>
+              <a:rPr lang="en-US"/>
               <a:t>Click to edit Master text styles</a:t>
             </a:r>
           </a:p>
           <a:p>
             <a:pPr lvl="1"/>
             <a:r>
-              <a:rPr lang="en-US" smtClean="0"/>
+              <a:rPr lang="en-US"/>
               <a:t>Second level</a:t>
             </a:r>
           </a:p>
           <a:p>
             <a:pPr lvl="2"/>
             <a:r>
-              <a:rPr lang="en-US" smtClean="0"/>
+              <a:rPr lang="en-US"/>
               <a:t>Third level</a:t>
             </a:r>
           </a:p>
           <a:p>
             <a:pPr lvl="3"/>
             <a:r>
-              <a:rPr lang="en-US" smtClean="0"/>
+              <a:rPr lang="en-US"/>
               <a:t>Fourth level</a:t>
             </a:r>
           </a:p>
           <a:p>
             <a:pPr lvl="4"/>
             <a:r>
-              <a:rPr lang="en-US" smtClean="0"/>
+              <a:rPr lang="en-US"/>
               <a:t>Fifth level</a:t>
             </a:r>
-            <a:endParaRPr lang="en-US"/>
           </a:p>
         </p:txBody>
       </p:sp>
@@ -2231,7 +2229,7 @@
           <a:p>
             <a:pPr lvl="0"/>
             <a:r>
-              <a:rPr lang="en-US" smtClean="0"/>
+              <a:rPr lang="en-US"/>
               <a:t>Click to edit Master text styles</a:t>
             </a:r>
           </a:p>
@@ -2254,7 +2252,7 @@
           <a:p>
             <a:fld id="{5BCAD085-E8A6-8845-BD4E-CB4CCA059FC4}" type="datetimeFigureOut">
               <a:rPr lang="en-US" smtClean="0"/>
-              <a:t>1/27/13</a:t>
+              <a:t>9/16/2025</a:t>
             </a:fld>
             <a:endParaRPr lang="en-US"/>
           </a:p>
@@ -2357,10 +2355,9 @@
           </a:lstStyle>
           <a:p>
             <a:r>
-              <a:rPr lang="en-US" smtClean="0"/>
+              <a:rPr lang="en-US"/>
               <a:t>Click to edit Master title style</a:t>
             </a:r>
-            <a:endParaRPr lang="en-US"/>
           </a:p>
         </p:txBody>
       </p:sp>
@@ -2484,7 +2481,7 @@
           <a:p>
             <a:pPr lvl="0"/>
             <a:r>
-              <a:rPr lang="en-US" smtClean="0"/>
+              <a:rPr lang="en-US"/>
               <a:t>Click to edit Master text styles</a:t>
             </a:r>
           </a:p>
@@ -2507,7 +2504,7 @@
           <a:p>
             <a:fld id="{5BCAD085-E8A6-8845-BD4E-CB4CCA059FC4}" type="datetimeFigureOut">
               <a:rPr lang="en-US" smtClean="0"/>
-              <a:t>1/27/13</a:t>
+              <a:t>9/16/2025</a:t>
             </a:fld>
             <a:endParaRPr lang="en-US"/>
           </a:p>
@@ -2616,10 +2613,9 @@
           <a:lstStyle/>
           <a:p>
             <a:r>
-              <a:rPr lang="en-US" smtClean="0"/>
+              <a:rPr lang="en-US"/>
               <a:t>Click to edit Master title style</a:t>
             </a:r>
-            <a:endParaRPr lang="en-US"/>
           </a:p>
         </p:txBody>
       </p:sp>
@@ -2650,38 +2646,37 @@
           <a:p>
             <a:pPr lvl="0"/>
             <a:r>
-              <a:rPr lang="en-US" smtClean="0"/>
+              <a:rPr lang="en-US"/>
               <a:t>Click to edit Master text styles</a:t>
             </a:r>
           </a:p>
           <a:p>
             <a:pPr lvl="1"/>
             <a:r>
-              <a:rPr lang="en-US" smtClean="0"/>
+              <a:rPr lang="en-US"/>
               <a:t>Second level</a:t>
             </a:r>
           </a:p>
           <a:p>
             <a:pPr lvl="2"/>
             <a:r>
-              <a:rPr lang="en-US" smtClean="0"/>
+              <a:rPr lang="en-US"/>
               <a:t>Third level</a:t>
             </a:r>
           </a:p>
           <a:p>
             <a:pPr lvl="3"/>
             <a:r>
-              <a:rPr lang="en-US" smtClean="0"/>
+              <a:rPr lang="en-US"/>
               <a:t>Fourth level</a:t>
             </a:r>
           </a:p>
           <a:p>
             <a:pPr lvl="4"/>
             <a:r>
-              <a:rPr lang="en-US" smtClean="0"/>
+              <a:rPr lang="en-US"/>
               <a:t>Fifth level</a:t>
             </a:r>
-            <a:endParaRPr lang="en-US"/>
           </a:p>
         </p:txBody>
       </p:sp>
@@ -2720,7 +2715,7 @@
           <a:p>
             <a:fld id="{5BCAD085-E8A6-8845-BD4E-CB4CCA059FC4}" type="datetimeFigureOut">
               <a:rPr lang="en-US" smtClean="0"/>
-              <a:t>1/27/13</a:t>
+              <a:t>9/16/2025</a:t>
             </a:fld>
             <a:endParaRPr lang="en-US"/>
           </a:p>
@@ -3079,7 +3074,7 @@
 </file>
 
 <file path=ppt/slides/slide1.xml><?xml version="1.0" encoding="utf-8"?>
-<p:sld xmlns:a="http://schemas.openxmlformats.org/drawingml/2006/main" xmlns:p="http://schemas.openxmlformats.org/presentationml/2006/main" xmlns:r="http://schemas.openxmlformats.org/officeDocument/2006/relationships">
+<p:sld xmlns:a="http://schemas.openxmlformats.org/drawingml/2006/main" xmlns:r="http://schemas.openxmlformats.org/officeDocument/2006/relationships" xmlns:p="http://schemas.openxmlformats.org/presentationml/2006/main">
   <p:cSld>
     <p:spTree>
       <p:nvGrpSpPr>
@@ -3087,7 +3082,14 @@
         <p:cNvGrpSpPr/>
         <p:nvPr/>
       </p:nvGrpSpPr>
-      <p:grpSpPr/>
+      <p:grpSpPr>
+        <a:xfrm>
+          <a:off x="0" y="0"/>
+          <a:ext cx="0" cy="0"/>
+          <a:chOff x="0" y="0"/>
+          <a:chExt cx="0" cy="0"/>
+        </a:xfrm>
+      </p:grpSpPr>
       <p:sp>
         <p:nvSpPr>
           <p:cNvPr id="2" name="Rounded Rectangle 1"/>
@@ -3132,6 +3134,7 @@
           <a:lstStyle/>
           <a:p>
             <a:pPr algn="ctr"/>
+            <a:endParaRPr/>
           </a:p>
           <a:p>
             <a:pPr algn="ctr">
@@ -3191,6 +3194,7 @@
           <a:lstStyle/>
           <a:p>
             <a:pPr algn="ctr"/>
+            <a:endParaRPr dirty="0"/>
           </a:p>
           <a:p>
             <a:pPr algn="l">
@@ -3201,14 +3205,21 @@
               </a:defRPr>
             </a:pPr>
             <a:r>
+              <a:rPr dirty="0"/>
               <a:t>- Rust refactoring is hard (ownership, lifetimes, effects)</a:t>
             </a:r>
-            <a:br/>
-            <a:r>
+            <a:br>
+              <a:rPr dirty="0"/>
+            </a:br>
+            <a:r>
+              <a:rPr dirty="0"/>
               <a:t>- Compilation success ≠ semantic equivalence</a:t>
             </a:r>
-            <a:br/>
-            <a:r>
+            <a:br>
+              <a:rPr dirty="0"/>
+            </a:br>
+            <a:r>
+              <a:rPr dirty="0"/>
               <a:t>- Need trustworthy, automated refactoring</a:t>
             </a:r>
           </a:p>
@@ -3258,6 +3269,7 @@
           <a:lstStyle/>
           <a:p>
             <a:pPr algn="ctr"/>
+            <a:endParaRPr/>
           </a:p>
           <a:p>
             <a:pPr algn="ctr">
@@ -3317,6 +3329,7 @@
           <a:lstStyle/>
           <a:p>
             <a:pPr algn="ctr"/>
+            <a:endParaRPr/>
           </a:p>
           <a:p>
             <a:pPr algn="l">
@@ -3385,6 +3398,7 @@
           <a:lstStyle/>
           <a:p>
             <a:pPr algn="ctr"/>
+            <a:endParaRPr dirty="0"/>
           </a:p>
           <a:p>
             <a:pPr algn="ctr">
@@ -3394,6 +3408,10 @@
                 </a:solidFill>
               </a:defRPr>
             </a:pPr>
+            <a:r>
+              <a:rPr lang="en-AU"/>
+              <a:t>Preliminary </a:t>
+            </a:r>
             <a:r>
               <a:t>Results</a:t>
             </a:r>
@@ -3444,6 +3462,7 @@
           <a:lstStyle/>
           <a:p>
             <a:pPr algn="ctr"/>
+            <a:endParaRPr/>
           </a:p>
           <a:p>
             <a:pPr algn="l">
@@ -3489,7 +3508,9 @@
             <a:spAutoFit/>
           </a:bodyPr>
           <a:lstStyle/>
-          <a:p/>
+          <a:p>
+            <a:endParaRPr/>
+          </a:p>
           <a:p>
             <a:pPr algn="ctr">
               <a:defRPr sz="10000" b="1"/>
@@ -3521,7 +3542,9 @@
             <a:spAutoFit/>
           </a:bodyPr>
           <a:lstStyle/>
-          <a:p/>
+          <a:p>
+            <a:endParaRPr/>
+          </a:p>
           <a:p>
             <a:pPr algn="ctr">
               <a:defRPr sz="6000" b="0"/>
@@ -3624,6 +3647,7 @@
           <a:lstStyle/>
           <a:p>
             <a:pPr algn="ctr"/>
+            <a:endParaRPr/>
           </a:p>
           <a:p>
             <a:pPr algn="ctr">
@@ -3683,6 +3707,7 @@
           <a:lstStyle/>
           <a:p>
             <a:pPr algn="ctr"/>
+            <a:endParaRPr/>
           </a:p>
           <a:p>
             <a:pPr algn="l">
@@ -3750,6 +3775,7 @@
           <a:lstStyle/>
           <a:p>
             <a:pPr algn="ctr"/>
+            <a:endParaRPr/>
           </a:p>
           <a:p>
             <a:pPr algn="ctr">
@@ -3809,6 +3835,7 @@
           <a:lstStyle/>
           <a:p>
             <a:pPr algn="ctr"/>
+            <a:endParaRPr/>
           </a:p>
           <a:p>
             <a:pPr algn="l">
@@ -3880,6 +3907,7 @@
           <a:lstStyle/>
           <a:p>
             <a:pPr algn="ctr"/>
+            <a:endParaRPr/>
           </a:p>
         </p:txBody>
       </p:sp>
@@ -3928,7 +3956,9 @@
             <a:spAutoFit/>
           </a:bodyPr>
           <a:lstStyle/>
-          <a:p/>
+          <a:p>
+            <a:endParaRPr/>
+          </a:p>
           <a:p>
             <a:pPr algn="l">
               <a:defRPr sz="6000" b="1"/>
@@ -3984,6 +4014,7 @@
           <a:lstStyle/>
           <a:p>
             <a:pPr algn="ctr"/>
+            <a:endParaRPr/>
           </a:p>
         </p:txBody>
       </p:sp>
@@ -4032,7 +4063,9 @@
             <a:spAutoFit/>
           </a:bodyPr>
           <a:lstStyle/>
-          <a:p/>
+          <a:p>
+            <a:endParaRPr/>
+          </a:p>
           <a:p>
             <a:pPr algn="l">
               <a:defRPr sz="6000" b="1"/>
@@ -4088,6 +4121,7 @@
           <a:lstStyle/>
           <a:p>
             <a:pPr algn="ctr"/>
+            <a:endParaRPr/>
           </a:p>
         </p:txBody>
       </p:sp>
@@ -4136,7 +4170,9 @@
             <a:spAutoFit/>
           </a:bodyPr>
           <a:lstStyle/>
-          <a:p/>
+          <a:p>
+            <a:endParaRPr/>
+          </a:p>
           <a:p>
             <a:pPr algn="l">
               <a:defRPr sz="6000" b="1"/>

</xml_diff>

<commit_message>
Updated structure of the report
</commit_message>
<xml_diff>
--- a/reports/splash_poster/working_copy.pptx
+++ b/reports/splash_poster/working_copy.pptx
@@ -6,7 +6,6 @@
   </p:sldMasterIdLst>
   <p:sldIdLst>
     <p:sldId id="256" r:id="rId2"/>
-    <p:sldId id="257" r:id="rId3"/>
   </p:sldIdLst>
   <p:sldSz cx="35999738" cy="35999738"/>
   <p:notesSz cx="6858000" cy="9144000"/>
@@ -303,7 +302,7 @@
           <a:p>
             <a:fld id="{5BCAD085-E8A6-8845-BD4E-CB4CCA059FC4}" type="datetimeFigureOut">
               <a:rPr lang="en-US" smtClean="0"/>
-              <a:t>9/18/2025</a:t>
+              <a:t>9/19/2025</a:t>
             </a:fld>
             <a:endParaRPr lang="en-US"/>
           </a:p>
@@ -471,7 +470,7 @@
           <a:p>
             <a:fld id="{5BCAD085-E8A6-8845-BD4E-CB4CCA059FC4}" type="datetimeFigureOut">
               <a:rPr lang="en-US" smtClean="0"/>
-              <a:t>9/18/2025</a:t>
+              <a:t>9/19/2025</a:t>
             </a:fld>
             <a:endParaRPr lang="en-US"/>
           </a:p>
@@ -649,7 +648,7 @@
           <a:p>
             <a:fld id="{5BCAD085-E8A6-8845-BD4E-CB4CCA059FC4}" type="datetimeFigureOut">
               <a:rPr lang="en-US" smtClean="0"/>
-              <a:t>9/18/2025</a:t>
+              <a:t>9/19/2025</a:t>
             </a:fld>
             <a:endParaRPr lang="en-US"/>
           </a:p>
@@ -817,7 +816,7 @@
           <a:p>
             <a:fld id="{5BCAD085-E8A6-8845-BD4E-CB4CCA059FC4}" type="datetimeFigureOut">
               <a:rPr lang="en-US" smtClean="0"/>
-              <a:t>9/18/2025</a:t>
+              <a:t>9/19/2025</a:t>
             </a:fld>
             <a:endParaRPr lang="en-US"/>
           </a:p>
@@ -1062,7 +1061,7 @@
           <a:p>
             <a:fld id="{5BCAD085-E8A6-8845-BD4E-CB4CCA059FC4}" type="datetimeFigureOut">
               <a:rPr lang="en-US" smtClean="0"/>
-              <a:t>9/18/2025</a:t>
+              <a:t>9/19/2025</a:t>
             </a:fld>
             <a:endParaRPr lang="en-US"/>
           </a:p>
@@ -1347,7 +1346,7 @@
           <a:p>
             <a:fld id="{5BCAD085-E8A6-8845-BD4E-CB4CCA059FC4}" type="datetimeFigureOut">
               <a:rPr lang="en-US" smtClean="0"/>
-              <a:t>9/18/2025</a:t>
+              <a:t>9/19/2025</a:t>
             </a:fld>
             <a:endParaRPr lang="en-US"/>
           </a:p>
@@ -1766,7 +1765,7 @@
           <a:p>
             <a:fld id="{5BCAD085-E8A6-8845-BD4E-CB4CCA059FC4}" type="datetimeFigureOut">
               <a:rPr lang="en-US" smtClean="0"/>
-              <a:t>9/18/2025</a:t>
+              <a:t>9/19/2025</a:t>
             </a:fld>
             <a:endParaRPr lang="en-US"/>
           </a:p>
@@ -1883,7 +1882,7 @@
           <a:p>
             <a:fld id="{5BCAD085-E8A6-8845-BD4E-CB4CCA059FC4}" type="datetimeFigureOut">
               <a:rPr lang="en-US" smtClean="0"/>
-              <a:t>9/18/2025</a:t>
+              <a:t>9/19/2025</a:t>
             </a:fld>
             <a:endParaRPr lang="en-US"/>
           </a:p>
@@ -1978,7 +1977,7 @@
           <a:p>
             <a:fld id="{5BCAD085-E8A6-8845-BD4E-CB4CCA059FC4}" type="datetimeFigureOut">
               <a:rPr lang="en-US" smtClean="0"/>
-              <a:t>9/18/2025</a:t>
+              <a:t>9/19/2025</a:t>
             </a:fld>
             <a:endParaRPr lang="en-US"/>
           </a:p>
@@ -2253,7 +2252,7 @@
           <a:p>
             <a:fld id="{5BCAD085-E8A6-8845-BD4E-CB4CCA059FC4}" type="datetimeFigureOut">
               <a:rPr lang="en-US" smtClean="0"/>
-              <a:t>9/18/2025</a:t>
+              <a:t>9/19/2025</a:t>
             </a:fld>
             <a:endParaRPr lang="en-US"/>
           </a:p>
@@ -2505,7 +2504,7 @@
           <a:p>
             <a:fld id="{5BCAD085-E8A6-8845-BD4E-CB4CCA059FC4}" type="datetimeFigureOut">
               <a:rPr lang="en-US" smtClean="0"/>
-              <a:t>9/18/2025</a:t>
+              <a:t>9/19/2025</a:t>
             </a:fld>
             <a:endParaRPr lang="en-US"/>
           </a:p>
@@ -2716,7 +2715,7 @@
           <a:p>
             <a:fld id="{5BCAD085-E8A6-8845-BD4E-CB4CCA059FC4}" type="datetimeFigureOut">
               <a:rPr lang="en-US" smtClean="0"/>
-              <a:t>9/18/2025</a:t>
+              <a:t>9/19/2025</a:t>
             </a:fld>
             <a:endParaRPr lang="en-US"/>
           </a:p>
@@ -3188,8 +3187,8 @@
           </a:p>
         </p:txBody>
       </p:sp>
-      <mc:AlternateContent xmlns:mc="http://schemas.openxmlformats.org/markup-compatibility/2006">
-        <mc:Choice xmlns:a14="http://schemas.microsoft.com/office/drawing/2010/main" Requires="a14">
+      <mc:AlternateContent xmlns:mc="http://schemas.openxmlformats.org/markup-compatibility/2006" xmlns:a14="http://schemas.microsoft.com/office/drawing/2010/main">
+        <mc:Choice Requires="a14">
           <p:sp>
             <p:nvSpPr>
               <p:cNvPr id="3" name="Rounded Rectangle 2"/>
@@ -3543,7 +3542,7 @@
             </p:txBody>
           </p:sp>
         </mc:Choice>
-        <mc:Fallback>
+        <mc:Fallback xmlns="">
           <p:sp>
             <p:nvSpPr>
               <p:cNvPr id="3" name="Rounded Rectangle 2"/>
@@ -5429,8 +5428,8 @@
           </a:p>
         </p:txBody>
       </p:sp>
-      <mc:AlternateContent xmlns:mc="http://schemas.openxmlformats.org/markup-compatibility/2006">
-        <mc:Choice xmlns:a14="http://schemas.microsoft.com/office/drawing/2010/main" Requires="a14">
+      <mc:AlternateContent xmlns:mc="http://schemas.openxmlformats.org/markup-compatibility/2006" xmlns:a14="http://schemas.microsoft.com/office/drawing/2010/main">
+        <mc:Choice Requires="a14">
           <p:sp>
             <p:nvSpPr>
               <p:cNvPr id="39" name="Rectangle: Rounded Corners 38">
@@ -5796,7 +5795,7 @@
             </p:txBody>
           </p:sp>
         </mc:Choice>
-        <mc:Fallback>
+        <mc:Fallback xmlns="">
           <p:sp>
             <p:nvSpPr>
               <p:cNvPr id="39" name="Rectangle: Rounded Corners 38">
@@ -7848,2325 +7847,6 @@
 </p:sld>
 </file>
 
-<file path=ppt/slides/slide2.xml><?xml version="1.0" encoding="utf-8"?>
-<p:sld xmlns:a="http://schemas.openxmlformats.org/drawingml/2006/main" xmlns:r="http://schemas.openxmlformats.org/officeDocument/2006/relationships" xmlns:p="http://schemas.openxmlformats.org/presentationml/2006/main">
-  <p:cSld>
-    <p:bg>
-      <p:bgPr>
-        <a:gradFill flip="none" rotWithShape="1">
-          <a:gsLst>
-            <a:gs pos="10000">
-              <a:srgbClr val="BE830E">
-                <a:alpha val="75000"/>
-              </a:srgbClr>
-            </a:gs>
-            <a:gs pos="73000">
-              <a:schemeClr val="accent6">
-                <a:lumMod val="45000"/>
-                <a:lumOff val="55000"/>
-                <a:alpha val="75000"/>
-              </a:schemeClr>
-            </a:gs>
-            <a:gs pos="59000">
-              <a:schemeClr val="accent6">
-                <a:lumMod val="45000"/>
-                <a:lumOff val="55000"/>
-                <a:alpha val="75000"/>
-              </a:schemeClr>
-            </a:gs>
-            <a:gs pos="97000">
-              <a:schemeClr val="accent6">
-                <a:lumMod val="30000"/>
-                <a:lumOff val="70000"/>
-                <a:alpha val="75000"/>
-              </a:schemeClr>
-            </a:gs>
-          </a:gsLst>
-          <a:lin ang="16200000" scaled="0"/>
-          <a:tileRect/>
-        </a:gradFill>
-        <a:effectLst/>
-      </p:bgPr>
-    </p:bg>
-    <p:spTree>
-      <p:nvGrpSpPr>
-        <p:cNvPr id="1" name="">
-          <a:extLst>
-            <a:ext uri="{FF2B5EF4-FFF2-40B4-BE49-F238E27FC236}">
-              <a16:creationId xmlns:a16="http://schemas.microsoft.com/office/drawing/2014/main" id="{C8770C25-7211-3200-D76C-8FF3C13D8048}"/>
-            </a:ext>
-          </a:extLst>
-        </p:cNvPr>
-        <p:cNvGrpSpPr/>
-        <p:nvPr/>
-      </p:nvGrpSpPr>
-      <p:grpSpPr>
-        <a:xfrm>
-          <a:off x="0" y="0"/>
-          <a:ext cx="0" cy="0"/>
-          <a:chOff x="0" y="0"/>
-          <a:chExt cx="0" cy="0"/>
-        </a:xfrm>
-      </p:grpSpPr>
-      <p:sp>
-        <p:nvSpPr>
-          <p:cNvPr id="2" name="Rounded Rectangle 1">
-            <a:extLst>
-              <a:ext uri="{FF2B5EF4-FFF2-40B4-BE49-F238E27FC236}">
-                <a16:creationId xmlns:a16="http://schemas.microsoft.com/office/drawing/2014/main" id="{A76D94FA-6C9E-E6F5-A291-53433524034A}"/>
-              </a:ext>
-            </a:extLst>
-          </p:cNvPr>
-          <p:cNvSpPr/>
-          <p:nvPr/>
-        </p:nvSpPr>
-        <p:spPr>
-          <a:xfrm>
-            <a:off x="720000" y="720000"/>
-            <a:ext cx="10560000" cy="2880000"/>
-          </a:xfrm>
-          <a:prstGeom prst="roundRect">
-            <a:avLst>
-              <a:gd name="adj" fmla="val 3409"/>
-            </a:avLst>
-          </a:prstGeom>
-          <a:solidFill>
-            <a:srgbClr val="FFE6E6"/>
-          </a:solidFill>
-          <a:ln w="25400">
-            <a:solidFill>
-              <a:srgbClr val="000000"/>
-            </a:solidFill>
-          </a:ln>
-        </p:spPr>
-        <p:style>
-          <a:lnRef idx="1">
-            <a:schemeClr val="accent1"/>
-          </a:lnRef>
-          <a:fillRef idx="3">
-            <a:schemeClr val="accent1"/>
-          </a:fillRef>
-          <a:effectRef idx="2">
-            <a:schemeClr val="accent1"/>
-          </a:effectRef>
-          <a:fontRef idx="minor">
-            <a:schemeClr val="lt1"/>
-          </a:fontRef>
-        </p:style>
-        <p:txBody>
-          <a:bodyPr rtlCol="0" anchor="ctr"/>
-          <a:lstStyle/>
-          <a:p>
-            <a:pPr algn="ctr"/>
-            <a:endParaRPr/>
-          </a:p>
-          <a:p>
-            <a:pPr algn="ctr">
-              <a:defRPr sz="6000" b="1">
-                <a:solidFill>
-                  <a:srgbClr val="000000"/>
-                </a:solidFill>
-              </a:defRPr>
-            </a:pPr>
-            <a:r>
-              <a:t>Motivation &amp; Problem</a:t>
-            </a:r>
-          </a:p>
-        </p:txBody>
-      </p:sp>
-      <mc:AlternateContent xmlns:mc="http://schemas.openxmlformats.org/markup-compatibility/2006" xmlns:a14="http://schemas.microsoft.com/office/drawing/2010/main">
-        <mc:Choice Requires="a14">
-          <p:sp>
-            <p:nvSpPr>
-              <p:cNvPr id="3" name="Rounded Rectangle 2">
-                <a:extLst>
-                  <a:ext uri="{FF2B5EF4-FFF2-40B4-BE49-F238E27FC236}">
-                    <a16:creationId xmlns:a16="http://schemas.microsoft.com/office/drawing/2014/main" id="{8EB70DD3-E95F-C6AB-11BB-1F50937926FA}"/>
-                  </a:ext>
-                </a:extLst>
-              </p:cNvPr>
-              <p:cNvSpPr/>
-              <p:nvPr/>
-            </p:nvSpPr>
-            <p:spPr>
-              <a:xfrm>
-                <a:off x="719738" y="3780000"/>
-                <a:ext cx="10560000" cy="10800000"/>
-              </a:xfrm>
-              <a:prstGeom prst="roundRect">
-                <a:avLst>
-                  <a:gd name="adj" fmla="val 3409"/>
-                </a:avLst>
-              </a:prstGeom>
-              <a:solidFill>
-                <a:srgbClr val="FFFFFF"/>
-              </a:solidFill>
-              <a:ln w="19050">
-                <a:solidFill>
-                  <a:srgbClr val="000000"/>
-                </a:solidFill>
-              </a:ln>
-            </p:spPr>
-            <p:style>
-              <a:lnRef idx="1">
-                <a:schemeClr val="accent1"/>
-              </a:lnRef>
-              <a:fillRef idx="3">
-                <a:schemeClr val="accent1"/>
-              </a:fillRef>
-              <a:effectRef idx="2">
-                <a:schemeClr val="accent1"/>
-              </a:effectRef>
-              <a:fontRef idx="minor">
-                <a:schemeClr val="lt1"/>
-              </a:fontRef>
-            </p:style>
-            <p:txBody>
-              <a:bodyPr rtlCol="0" anchor="t"/>
-              <a:lstStyle/>
-              <a:p>
-                <a:pPr marL="285750" indent="-285750">
-                  <a:buFont typeface="Arial" panose="020B0604020202020204" pitchFamily="34" charset="0"/>
-                  <a:buChar char="•"/>
-                </a:pPr>
-                <a:r>
-                  <a:rPr lang="en-AU" sz="3000" b="1" dirty="0">
-                    <a:solidFill>
-                      <a:schemeClr val="tx1"/>
-                    </a:solidFill>
-                  </a:rPr>
-                  <a:t>Refactoring is Essential.</a:t>
-                </a:r>
-                <a:r>
-                  <a:rPr lang="en-AU" sz="3000" dirty="0">
-                    <a:solidFill>
-                      <a:schemeClr val="tx1"/>
-                    </a:solidFill>
-                  </a:rPr>
-                  <a:t> Developers spend much of their time improving existing codebases, and refactoring helps reduce technical debt, improve readability, and simplify testing.</a:t>
-                </a:r>
-              </a:p>
-              <a:p>
-                <a:pPr marL="285750" indent="-285750">
-                  <a:buFont typeface="Arial" panose="020B0604020202020204" pitchFamily="34" charset="0"/>
-                  <a:buChar char="•"/>
-                </a:pPr>
-                <a:r>
-                  <a:rPr lang="en-AU" sz="3000" b="1" dirty="0">
-                    <a:solidFill>
-                      <a:schemeClr val="tx1"/>
-                    </a:solidFill>
-                  </a:rPr>
-                  <a:t>Extract Method matters. </a:t>
-                </a:r>
-                <a:r>
-                  <a:rPr lang="en-AU" sz="3000" dirty="0">
-                    <a:solidFill>
-                      <a:schemeClr val="tx1"/>
-                    </a:solidFill>
-                  </a:rPr>
-                  <a:t>Splitting large methods into smaller, named functions is one of the most common and effective </a:t>
-                </a:r>
-                <a:r>
-                  <a:rPr lang="en-AU" sz="3000" dirty="0" err="1">
-                    <a:solidFill>
-                      <a:schemeClr val="tx1"/>
-                    </a:solidFill>
-                  </a:rPr>
-                  <a:t>refactorings</a:t>
-                </a:r>
-                <a:r>
-                  <a:rPr lang="en-AU" sz="3000" dirty="0">
-                    <a:solidFill>
-                      <a:schemeClr val="tx1"/>
-                    </a:solidFill>
-                  </a:rPr>
-                  <a:t>. In garbage collected languages (Java, Python), this is trivial.</a:t>
-                </a:r>
-              </a:p>
-              <a:p>
-                <a:pPr marL="285750" indent="-285750">
-                  <a:buFont typeface="Arial" panose="020B0604020202020204" pitchFamily="34" charset="0"/>
-                  <a:buChar char="•"/>
-                </a:pPr>
-                <a:r>
-                  <a:rPr lang="en-AU" sz="3000" b="1" dirty="0">
-                    <a:solidFill>
-                      <a:schemeClr val="tx1"/>
-                    </a:solidFill>
-                  </a:rPr>
-                  <a:t>Rust is Different.</a:t>
-                </a:r>
-                <a:r>
-                  <a:rPr lang="en-AU" sz="3000" dirty="0">
-                    <a:solidFill>
-                      <a:schemeClr val="tx1"/>
-                    </a:solidFill>
-                  </a:rPr>
-                  <a:t> Ownership, borrowing and lifetimes – Rust’s safety guarantees – make naïve extraction nearly impossible.</a:t>
-                </a:r>
-                <a:endParaRPr lang="en-GB" sz="3000" dirty="0">
-                  <a:solidFill>
-                    <a:schemeClr val="tx1"/>
-                  </a:solidFill>
-                </a:endParaRPr>
-              </a:p>
-              <a:p>
-                <a:pPr marL="742950" lvl="1" indent="-285750">
-                  <a:buFont typeface="Arial" panose="020B0604020202020204" pitchFamily="34" charset="0"/>
-                  <a:buChar char="•"/>
-                </a:pPr>
-                <a:r>
-                  <a:rPr lang="en-GB" sz="3000" dirty="0">
-                    <a:solidFill>
-                      <a:schemeClr val="tx1"/>
-                    </a:solidFill>
-                  </a:rPr>
-                  <a:t>Moving values breaks ownership</a:t>
-                </a:r>
-              </a:p>
-              <a:p>
-                <a:pPr marL="742950" lvl="1" indent="-285750">
-                  <a:buFont typeface="Arial" panose="020B0604020202020204" pitchFamily="34" charset="0"/>
-                  <a:buChar char="•"/>
-                </a:pPr>
-                <a:r>
-                  <a:rPr lang="en-GB" sz="3000" dirty="0">
-                    <a:solidFill>
-                      <a:schemeClr val="tx1"/>
-                    </a:solidFill>
-                  </a:rPr>
-                  <a:t>Borrows (</a:t>
-                </a:r>
-                <a:r>
-                  <a:rPr lang="en-GB" sz="3000" dirty="0">
-                    <a:solidFill>
-                      <a:schemeClr val="tx1"/>
-                    </a:solidFill>
-                    <a:highlight>
-                      <a:srgbClr val="C0C0C0"/>
-                    </a:highlight>
-                    <a:latin typeface="Cascadia Code" panose="020B0609020000020004" pitchFamily="49" charset="0"/>
-                    <a:cs typeface="Cascadia Code" panose="020B0609020000020004" pitchFamily="49" charset="0"/>
-                  </a:rPr>
-                  <a:t>&amp;T</a:t>
-                </a:r>
-                <a:r>
-                  <a:rPr lang="en-GB" sz="3000" dirty="0">
-                    <a:solidFill>
-                      <a:schemeClr val="tx1"/>
-                    </a:solidFill>
-                  </a:rPr>
-                  <a:t>, </a:t>
-                </a:r>
-                <a:r>
-                  <a:rPr lang="en-GB" sz="3000" dirty="0">
-                    <a:solidFill>
-                      <a:schemeClr val="tx1"/>
-                    </a:solidFill>
-                    <a:highlight>
-                      <a:srgbClr val="C0C0C0"/>
-                    </a:highlight>
-                    <a:latin typeface="Cascadia Code" panose="020B0609020000020004" pitchFamily="49" charset="0"/>
-                    <a:cs typeface="Cascadia Code" panose="020B0609020000020004" pitchFamily="49" charset="0"/>
-                  </a:rPr>
-                  <a:t>&amp;mut T</a:t>
-                </a:r>
-                <a:r>
-                  <a:rPr lang="en-GB" sz="3000" dirty="0">
-                    <a:solidFill>
-                      <a:schemeClr val="tx1"/>
-                    </a:solidFill>
-                  </a:rPr>
-                  <a:t>) can easily  become invalid</a:t>
-                </a:r>
-              </a:p>
-              <a:p>
-                <a:pPr marL="742950" lvl="1" indent="-285750">
-                  <a:buFont typeface="Arial" panose="020B0604020202020204" pitchFamily="34" charset="0"/>
-                  <a:buChar char="•"/>
-                </a:pPr>
-                <a:r>
-                  <a:rPr lang="en-GB" sz="3000" dirty="0">
-                    <a:solidFill>
-                      <a:schemeClr val="tx1"/>
-                    </a:solidFill>
-                  </a:rPr>
-                  <a:t>Lifetimes may need explicit annotations the compiler won’t infer automatically</a:t>
-                </a:r>
-              </a:p>
-              <a:p>
-                <a:pPr marL="742950" lvl="1" indent="-285750">
-                  <a:buFont typeface="Arial" panose="020B0604020202020204" pitchFamily="34" charset="0"/>
-                  <a:buChar char="•"/>
-                </a:pPr>
-                <a:r>
-                  <a:rPr lang="en-GB" sz="3000" dirty="0">
-                    <a:solidFill>
-                      <a:schemeClr val="tx1"/>
-                    </a:solidFill>
-                  </a:rPr>
-                  <a:t>Non-local control flow (</a:t>
-                </a:r>
-                <a:r>
-                  <a:rPr lang="en-GB" sz="3000" dirty="0">
-                    <a:solidFill>
-                      <a:schemeClr val="tx1"/>
-                    </a:solidFill>
-                    <a:highlight>
-                      <a:srgbClr val="C0C0C0"/>
-                    </a:highlight>
-                    <a:latin typeface="Cascadia Code" panose="020B0609020000020004" pitchFamily="49" charset="0"/>
-                    <a:cs typeface="Cascadia Code" panose="020B0609020000020004" pitchFamily="49" charset="0"/>
-                  </a:rPr>
-                  <a:t>return</a:t>
-                </a:r>
-                <a:r>
-                  <a:rPr lang="en-GB" sz="3000" dirty="0">
-                    <a:solidFill>
-                      <a:schemeClr val="tx1"/>
-                    </a:solidFill>
-                  </a:rPr>
-                  <a:t>, </a:t>
-                </a:r>
-                <a:r>
-                  <a:rPr lang="en-GB" sz="3000" dirty="0">
-                    <a:solidFill>
-                      <a:schemeClr val="tx1"/>
-                    </a:solidFill>
-                    <a:highlight>
-                      <a:srgbClr val="C0C0C0"/>
-                    </a:highlight>
-                    <a:latin typeface="Cascadia Code" panose="020B0609020000020004" pitchFamily="49" charset="0"/>
-                    <a:cs typeface="Cascadia Code" panose="020B0609020000020004" pitchFamily="49" charset="0"/>
-                  </a:rPr>
-                  <a:t>break</a:t>
-                </a:r>
-                <a:r>
-                  <a:rPr lang="en-GB" sz="3000" dirty="0">
-                    <a:solidFill>
-                      <a:schemeClr val="tx1"/>
-                    </a:solidFill>
-                  </a:rPr>
-                  <a:t>) doesn’t trivially transfer to a new function</a:t>
-                </a:r>
-              </a:p>
-              <a:p>
-                <a:pPr marL="285750" indent="-285750">
-                  <a:buFont typeface="Arial" panose="020B0604020202020204" pitchFamily="34" charset="0"/>
-                  <a:buChar char="•"/>
-                </a:pPr>
-                <a:r>
-                  <a:rPr lang="en-AU" sz="3000" b="1" dirty="0">
-                    <a:solidFill>
-                      <a:schemeClr val="tx1"/>
-                    </a:solidFill>
-                  </a:rPr>
-                  <a:t>The gap. </a:t>
-                </a:r>
-                <a:r>
-                  <a:rPr lang="en-AU" sz="3000" dirty="0">
-                    <a:solidFill>
-                      <a:schemeClr val="tx1"/>
-                    </a:solidFill>
-                  </a:rPr>
-                  <a:t>Existing IDE tools (IntelliJ’s Rust Plugin, Rust Analyzer) handle only simple extractions. They often fail on asynchronous code, generics, macros or complex lifetimes. Developers are often left with uncompilable or subtly incorrect code. </a:t>
-                </a:r>
-              </a:p>
-              <a:p>
-                <a:pPr marL="285750" indent="-285750">
-                  <a:buFont typeface="Arial" panose="020B0604020202020204" pitchFamily="34" charset="0"/>
-                  <a:buChar char="•"/>
-                </a:pPr>
-                <a:r>
-                  <a:rPr lang="en-AU" sz="3000" b="1" dirty="0">
-                    <a:solidFill>
-                      <a:schemeClr val="tx1"/>
-                    </a:solidFill>
-                  </a:rPr>
-                  <a:t>Why this matters. </a:t>
-                </a:r>
-                <a:r>
-                  <a:rPr lang="en-AU" sz="3000" dirty="0">
-                    <a:solidFill>
-                      <a:schemeClr val="tx1"/>
-                    </a:solidFill>
-                  </a:rPr>
-                  <a:t>In high-assurance domains, a refactoring that might silently change semantics is unacceptable. Even in Rust, compilation success </a:t>
-                </a:r>
-                <a14:m>
-                  <m:oMath xmlns:m="http://schemas.openxmlformats.org/officeDocument/2006/math">
-                    <m:r>
-                      <a:rPr lang="en-AU" sz="3000" i="1" smtClean="0">
-                        <a:solidFill>
-                          <a:schemeClr val="tx1"/>
-                        </a:solidFill>
-                        <a:latin typeface="Cambria Math" panose="02040503050406030204" pitchFamily="18" charset="0"/>
-                        <a:ea typeface="Cambria Math" panose="02040503050406030204" pitchFamily="18" charset="0"/>
-                      </a:rPr>
-                      <m:t>≠</m:t>
-                    </m:r>
-                  </m:oMath>
-                </a14:m>
-                <a:r>
-                  <a:rPr lang="en-GB" sz="3000" b="1" dirty="0">
-                    <a:solidFill>
-                      <a:schemeClr val="tx1"/>
-                    </a:solidFill>
-                  </a:rPr>
-                  <a:t> </a:t>
-                </a:r>
-                <a:r>
-                  <a:rPr lang="en-GB" sz="3000" dirty="0">
-                    <a:solidFill>
-                      <a:schemeClr val="tx1"/>
-                    </a:solidFill>
-                  </a:rPr>
-                  <a:t>semantic equivalence.</a:t>
-                </a:r>
-                <a:endParaRPr lang="en-GB" sz="3000" b="1" dirty="0">
-                  <a:solidFill>
-                    <a:schemeClr val="tx1"/>
-                  </a:solidFill>
-                </a:endParaRPr>
-              </a:p>
-            </p:txBody>
-          </p:sp>
-        </mc:Choice>
-        <mc:Fallback xmlns="">
-          <p:sp>
-            <p:nvSpPr>
-              <p:cNvPr id="3" name="Rounded Rectangle 2">
-                <a:extLst>
-                  <a:ext uri="{FF2B5EF4-FFF2-40B4-BE49-F238E27FC236}">
-                    <a16:creationId xmlns:a16="http://schemas.microsoft.com/office/drawing/2014/main" id="{8EB70DD3-E95F-C6AB-11BB-1F50937926FA}"/>
-                  </a:ext>
-                </a:extLst>
-              </p:cNvPr>
-              <p:cNvSpPr>
-                <a:spLocks noRot="1" noChangeAspect="1" noMove="1" noResize="1" noEditPoints="1" noAdjustHandles="1" noChangeArrowheads="1" noChangeShapeType="1" noTextEdit="1"/>
-              </p:cNvSpPr>
-              <p:nvPr/>
-            </p:nvSpPr>
-            <p:spPr>
-              <a:xfrm>
-                <a:off x="719738" y="3780000"/>
-                <a:ext cx="10560000" cy="10800000"/>
-              </a:xfrm>
-              <a:prstGeom prst="roundRect">
-                <a:avLst>
-                  <a:gd name="adj" fmla="val 3409"/>
-                </a:avLst>
-              </a:prstGeom>
-              <a:blipFill>
-                <a:blip r:embed="rId2"/>
-                <a:stretch>
-                  <a:fillRect/>
-                </a:stretch>
-              </a:blipFill>
-              <a:ln w="19050">
-                <a:solidFill>
-                  <a:srgbClr val="000000"/>
-                </a:solidFill>
-              </a:ln>
-            </p:spPr>
-            <p:txBody>
-              <a:bodyPr/>
-              <a:lstStyle/>
-              <a:p>
-                <a:r>
-                  <a:rPr lang="en-AU">
-                    <a:noFill/>
-                  </a:rPr>
-                  <a:t> </a:t>
-                </a:r>
-              </a:p>
-            </p:txBody>
-          </p:sp>
-        </mc:Fallback>
-      </mc:AlternateContent>
-      <p:sp>
-        <p:nvSpPr>
-          <p:cNvPr id="4" name="Rounded Rectangle 3">
-            <a:extLst>
-              <a:ext uri="{FF2B5EF4-FFF2-40B4-BE49-F238E27FC236}">
-                <a16:creationId xmlns:a16="http://schemas.microsoft.com/office/drawing/2014/main" id="{7CAAA70A-8190-6827-2178-77662D5F4E15}"/>
-              </a:ext>
-            </a:extLst>
-          </p:cNvPr>
-          <p:cNvSpPr/>
-          <p:nvPr/>
-        </p:nvSpPr>
-        <p:spPr>
-          <a:xfrm>
-            <a:off x="12720000" y="720000"/>
-            <a:ext cx="10560000" cy="2880000"/>
-          </a:xfrm>
-          <a:prstGeom prst="roundRect">
-            <a:avLst>
-              <a:gd name="adj" fmla="val 3409"/>
-            </a:avLst>
-          </a:prstGeom>
-          <a:solidFill>
-            <a:srgbClr val="E6F0FF"/>
-          </a:solidFill>
-          <a:ln w="25400">
-            <a:solidFill>
-              <a:srgbClr val="000000"/>
-            </a:solidFill>
-          </a:ln>
-        </p:spPr>
-        <p:style>
-          <a:lnRef idx="1">
-            <a:schemeClr val="accent1"/>
-          </a:lnRef>
-          <a:fillRef idx="3">
-            <a:schemeClr val="accent1"/>
-          </a:fillRef>
-          <a:effectRef idx="2">
-            <a:schemeClr val="accent1"/>
-          </a:effectRef>
-          <a:fontRef idx="minor">
-            <a:schemeClr val="lt1"/>
-          </a:fontRef>
-        </p:style>
-        <p:txBody>
-          <a:bodyPr rtlCol="0" anchor="ctr"/>
-          <a:lstStyle/>
-          <a:p>
-            <a:pPr algn="ctr"/>
-            <a:endParaRPr dirty="0"/>
-          </a:p>
-          <a:p>
-            <a:pPr algn="ctr">
-              <a:defRPr sz="6000" b="1">
-                <a:solidFill>
-                  <a:srgbClr val="000000"/>
-                </a:solidFill>
-              </a:defRPr>
-            </a:pPr>
-            <a:r>
-              <a:rPr dirty="0"/>
-              <a:t>Approach &amp; Pipeline</a:t>
-            </a:r>
-          </a:p>
-        </p:txBody>
-      </p:sp>
-      <p:sp>
-        <p:nvSpPr>
-          <p:cNvPr id="5" name="Rounded Rectangle 4">
-            <a:extLst>
-              <a:ext uri="{FF2B5EF4-FFF2-40B4-BE49-F238E27FC236}">
-                <a16:creationId xmlns:a16="http://schemas.microsoft.com/office/drawing/2014/main" id="{FE7DFBF4-8C3F-4A7A-CF1C-0A947295CD14}"/>
-              </a:ext>
-            </a:extLst>
-          </p:cNvPr>
-          <p:cNvSpPr/>
-          <p:nvPr/>
-        </p:nvSpPr>
-        <p:spPr>
-          <a:xfrm>
-            <a:off x="12720000" y="3799050"/>
-            <a:ext cx="10560000" cy="10800000"/>
-          </a:xfrm>
-          <a:prstGeom prst="roundRect">
-            <a:avLst>
-              <a:gd name="adj" fmla="val 3409"/>
-            </a:avLst>
-          </a:prstGeom>
-          <a:solidFill>
-            <a:srgbClr val="FFFFFF"/>
-          </a:solidFill>
-          <a:ln w="19050">
-            <a:solidFill>
-              <a:srgbClr val="000000"/>
-            </a:solidFill>
-          </a:ln>
-        </p:spPr>
-        <p:style>
-          <a:lnRef idx="1">
-            <a:schemeClr val="accent1"/>
-          </a:lnRef>
-          <a:fillRef idx="3">
-            <a:schemeClr val="accent1"/>
-          </a:fillRef>
-          <a:effectRef idx="2">
-            <a:schemeClr val="accent1"/>
-          </a:effectRef>
-          <a:fontRef idx="minor">
-            <a:schemeClr val="lt1"/>
-          </a:fontRef>
-        </p:style>
-        <p:txBody>
-          <a:bodyPr rtlCol="0" anchor="t"/>
-          <a:lstStyle/>
-          <a:p>
-            <a:pPr algn="ctr"/>
-            <a:endParaRPr sz="3000" dirty="0"/>
-          </a:p>
-          <a:p>
-            <a:pPr marL="857250" indent="-857250" algn="l">
-              <a:buFont typeface="+mj-lt"/>
-              <a:buAutoNum type="romanUcPeriod"/>
-              <a:defRPr sz="3600">
-                <a:solidFill>
-                  <a:srgbClr val="000000"/>
-                </a:solidFill>
-              </a:defRPr>
-            </a:pPr>
-            <a:r>
-              <a:rPr lang="en-AU" sz="3000" b="1" dirty="0"/>
-              <a:t>Extraction</a:t>
-            </a:r>
-          </a:p>
-          <a:p>
-            <a:pPr marL="1314450" lvl="1" indent="-857250">
-              <a:buFont typeface="Arial" panose="020B0604020202020204" pitchFamily="34" charset="0"/>
-              <a:buChar char="•"/>
-              <a:defRPr sz="3600">
-                <a:solidFill>
-                  <a:srgbClr val="000000"/>
-                </a:solidFill>
-              </a:defRPr>
-            </a:pPr>
-            <a:r>
-              <a:rPr lang="en-AU" sz="3000" dirty="0"/>
-              <a:t>User selects code region</a:t>
-            </a:r>
-          </a:p>
-          <a:p>
-            <a:pPr marL="1314450" lvl="1" indent="-857250">
-              <a:buFont typeface="Arial" panose="020B0604020202020204" pitchFamily="34" charset="0"/>
-              <a:buChar char="•"/>
-              <a:defRPr sz="3600">
-                <a:solidFill>
-                  <a:srgbClr val="000000"/>
-                </a:solidFill>
-              </a:defRPr>
-            </a:pPr>
-            <a:r>
-              <a:rPr lang="en-AU" sz="3000" i="1" dirty="0"/>
-              <a:t>“Copy and Paste”</a:t>
-            </a:r>
-          </a:p>
-          <a:p>
-            <a:pPr marL="857250" indent="-857250" algn="l">
-              <a:buFont typeface="+mj-lt"/>
-              <a:buAutoNum type="romanUcPeriod"/>
-              <a:defRPr sz="3600">
-                <a:solidFill>
-                  <a:srgbClr val="000000"/>
-                </a:solidFill>
-              </a:defRPr>
-            </a:pPr>
-            <a:r>
-              <a:rPr lang="en-AU" sz="3000" b="1" dirty="0"/>
-              <a:t>REM</a:t>
-            </a:r>
-          </a:p>
-          <a:p>
-            <a:pPr marL="1314450" lvl="1" indent="-857250">
-              <a:buFont typeface="Arial" panose="020B0604020202020204" pitchFamily="34" charset="0"/>
-              <a:buChar char="•"/>
-              <a:defRPr sz="3600">
-                <a:solidFill>
-                  <a:srgbClr val="000000"/>
-                </a:solidFill>
-              </a:defRPr>
-            </a:pPr>
-            <a:r>
-              <a:rPr lang="en-AU" sz="3000" dirty="0"/>
-              <a:t>Repairs  lifetimes</a:t>
-            </a:r>
-          </a:p>
-          <a:p>
-            <a:pPr marL="1314450" lvl="1" indent="-857250">
-              <a:buFont typeface="Arial" panose="020B0604020202020204" pitchFamily="34" charset="0"/>
-              <a:buChar char="•"/>
-              <a:defRPr sz="3600">
-                <a:solidFill>
-                  <a:srgbClr val="000000"/>
-                </a:solidFill>
-              </a:defRPr>
-            </a:pPr>
-            <a:r>
-              <a:rPr lang="en-AU" sz="3000" dirty="0"/>
-              <a:t>Infers borrows &amp;</a:t>
-            </a:r>
-          </a:p>
-          <a:p>
-            <a:pPr lvl="1">
-              <a:defRPr sz="3600">
-                <a:solidFill>
-                  <a:srgbClr val="000000"/>
-                </a:solidFill>
-              </a:defRPr>
-            </a:pPr>
-            <a:r>
-              <a:rPr lang="en-AU" sz="3000" dirty="0"/>
-              <a:t>		ownership</a:t>
-            </a:r>
-          </a:p>
-          <a:p>
-            <a:pPr marL="857250" indent="-857250" algn="l">
-              <a:buFont typeface="+mj-lt"/>
-              <a:buAutoNum type="romanUcPeriod"/>
-              <a:defRPr sz="3600">
-                <a:solidFill>
-                  <a:srgbClr val="000000"/>
-                </a:solidFill>
-              </a:defRPr>
-            </a:pPr>
-            <a:r>
-              <a:rPr lang="en-AU" sz="3000" b="1" dirty="0"/>
-              <a:t>CHARON</a:t>
-            </a:r>
-          </a:p>
-          <a:p>
-            <a:pPr marL="1314450" lvl="1" indent="-857250">
-              <a:buFont typeface="Arial" panose="020B0604020202020204" pitchFamily="34" charset="0"/>
-              <a:buChar char="•"/>
-              <a:defRPr sz="3600">
-                <a:solidFill>
-                  <a:srgbClr val="000000"/>
-                </a:solidFill>
-              </a:defRPr>
-            </a:pPr>
-            <a:r>
-              <a:rPr lang="en-AU" sz="3000" dirty="0"/>
-              <a:t>Translates Rust to LLBC</a:t>
-            </a:r>
-          </a:p>
-          <a:p>
-            <a:pPr lvl="1">
-              <a:defRPr sz="3600">
-                <a:solidFill>
-                  <a:srgbClr val="000000"/>
-                </a:solidFill>
-              </a:defRPr>
-            </a:pPr>
-            <a:r>
-              <a:rPr lang="en-AU" sz="3000" dirty="0"/>
-              <a:t>	     (a Lambda Calculus)</a:t>
-            </a:r>
-          </a:p>
-          <a:p>
-            <a:pPr marL="1314450" lvl="1" indent="-857250">
-              <a:buFont typeface="Arial" panose="020B0604020202020204" pitchFamily="34" charset="0"/>
-              <a:buChar char="•"/>
-              <a:defRPr sz="3600">
-                <a:solidFill>
-                  <a:srgbClr val="000000"/>
-                </a:solidFill>
-              </a:defRPr>
-            </a:pPr>
-            <a:r>
-              <a:rPr lang="en-AU" sz="3000" dirty="0"/>
-              <a:t>Isolates </a:t>
-            </a:r>
-            <a:r>
-              <a:rPr lang="en-AU" sz="3000" dirty="0" err="1"/>
-              <a:t>rustc</a:t>
-            </a:r>
-            <a:r>
-              <a:rPr lang="en-AU" sz="3000" dirty="0"/>
-              <a:t> internals.</a:t>
-            </a:r>
-          </a:p>
-          <a:p>
-            <a:pPr marL="1314450" lvl="1" indent="-857250">
-              <a:buFont typeface="Arial" panose="020B0604020202020204" pitchFamily="34" charset="0"/>
-              <a:buChar char="•"/>
-              <a:defRPr sz="3600">
-                <a:solidFill>
-                  <a:srgbClr val="000000"/>
-                </a:solidFill>
-              </a:defRPr>
-            </a:pPr>
-            <a:r>
-              <a:rPr lang="en-AU" sz="3000" dirty="0"/>
-              <a:t>Allows for semantic analysis</a:t>
-            </a:r>
-          </a:p>
-          <a:p>
-            <a:pPr marL="857250" indent="-857250" algn="l">
-              <a:buFont typeface="+mj-lt"/>
-              <a:buAutoNum type="romanUcPeriod"/>
-              <a:defRPr sz="3600">
-                <a:solidFill>
-                  <a:srgbClr val="000000"/>
-                </a:solidFill>
-              </a:defRPr>
-            </a:pPr>
-            <a:r>
-              <a:rPr lang="en-AU" sz="3000" b="1" dirty="0"/>
-              <a:t>Aeneas</a:t>
-            </a:r>
-          </a:p>
-          <a:p>
-            <a:pPr marL="1314450" lvl="1" indent="-857250">
-              <a:buFont typeface="Arial" panose="020B0604020202020204" pitchFamily="34" charset="0"/>
-              <a:buChar char="•"/>
-              <a:defRPr sz="3600">
-                <a:solidFill>
-                  <a:srgbClr val="000000"/>
-                </a:solidFill>
-              </a:defRPr>
-            </a:pPr>
-            <a:r>
-              <a:rPr lang="en-AU" sz="3000" dirty="0"/>
-              <a:t>Functionalises LLBC</a:t>
-            </a:r>
-          </a:p>
-          <a:p>
-            <a:pPr marL="1314450" lvl="1" indent="-857250">
-              <a:buFont typeface="Arial" panose="020B0604020202020204" pitchFamily="34" charset="0"/>
-              <a:buChar char="•"/>
-              <a:defRPr sz="3600">
-                <a:solidFill>
-                  <a:srgbClr val="000000"/>
-                </a:solidFill>
-              </a:defRPr>
-            </a:pPr>
-            <a:r>
-              <a:rPr lang="en-AU" sz="3000" dirty="0"/>
-              <a:t>Prepares verification conditions</a:t>
-            </a:r>
-          </a:p>
-          <a:p>
-            <a:pPr marL="857250" indent="-857250" algn="l">
-              <a:buFont typeface="+mj-lt"/>
-              <a:buAutoNum type="romanUcPeriod"/>
-              <a:defRPr sz="3600">
-                <a:solidFill>
-                  <a:srgbClr val="000000"/>
-                </a:solidFill>
-              </a:defRPr>
-            </a:pPr>
-            <a:r>
-              <a:rPr lang="en-AU" sz="3000" b="1" dirty="0"/>
-              <a:t>Coq</a:t>
-            </a:r>
-          </a:p>
-          <a:p>
-            <a:pPr marL="1314450" lvl="1" indent="-857250">
-              <a:buFont typeface="Arial" panose="020B0604020202020204" pitchFamily="34" charset="0"/>
-              <a:buChar char="•"/>
-              <a:defRPr sz="3600">
-                <a:solidFill>
-                  <a:srgbClr val="000000"/>
-                </a:solidFill>
-              </a:defRPr>
-            </a:pPr>
-            <a:r>
-              <a:rPr lang="en-AU" sz="3000" dirty="0"/>
-              <a:t>Checks observational</a:t>
-            </a:r>
-          </a:p>
-          <a:p>
-            <a:pPr lvl="1">
-              <a:defRPr sz="3600">
-                <a:solidFill>
-                  <a:srgbClr val="000000"/>
-                </a:solidFill>
-              </a:defRPr>
-            </a:pPr>
-            <a:r>
-              <a:rPr lang="en-AU" sz="3000" dirty="0"/>
-              <a:t>     		equivalence proofs</a:t>
-            </a:r>
-          </a:p>
-          <a:p>
-            <a:pPr marL="914400" lvl="1" indent="-457200">
-              <a:buFont typeface="Arial" panose="020B0604020202020204" pitchFamily="34" charset="0"/>
-              <a:buChar char="•"/>
-              <a:defRPr sz="3600">
-                <a:solidFill>
-                  <a:srgbClr val="000000"/>
-                </a:solidFill>
-              </a:defRPr>
-            </a:pPr>
-            <a:r>
-              <a:rPr lang="en-AU" sz="3000" dirty="0"/>
-              <a:t>     Discharges correctness </a:t>
-            </a:r>
-          </a:p>
-          <a:p>
-            <a:pPr lvl="1">
-              <a:defRPr sz="3600">
-                <a:solidFill>
-                  <a:srgbClr val="000000"/>
-                </a:solidFill>
-              </a:defRPr>
-            </a:pPr>
-            <a:r>
-              <a:rPr lang="en-AU" sz="3000" dirty="0"/>
-              <a:t> 		automatically</a:t>
-            </a:r>
-            <a:endParaRPr sz="3000" dirty="0"/>
-          </a:p>
-        </p:txBody>
-      </p:sp>
-      <p:sp>
-        <p:nvSpPr>
-          <p:cNvPr id="6" name="Rounded Rectangle 5">
-            <a:extLst>
-              <a:ext uri="{FF2B5EF4-FFF2-40B4-BE49-F238E27FC236}">
-                <a16:creationId xmlns:a16="http://schemas.microsoft.com/office/drawing/2014/main" id="{C05DD6B9-D0D6-811E-CDA6-BC5371737907}"/>
-              </a:ext>
-            </a:extLst>
-          </p:cNvPr>
-          <p:cNvSpPr/>
-          <p:nvPr/>
-        </p:nvSpPr>
-        <p:spPr>
-          <a:xfrm>
-            <a:off x="24720000" y="720000"/>
-            <a:ext cx="10560000" cy="2880000"/>
-          </a:xfrm>
-          <a:prstGeom prst="roundRect">
-            <a:avLst>
-              <a:gd name="adj" fmla="val 3409"/>
-            </a:avLst>
-          </a:prstGeom>
-          <a:solidFill>
-            <a:srgbClr val="E6FFE6"/>
-          </a:solidFill>
-          <a:ln w="25400">
-            <a:solidFill>
-              <a:srgbClr val="000000"/>
-            </a:solidFill>
-          </a:ln>
-        </p:spPr>
-        <p:style>
-          <a:lnRef idx="1">
-            <a:schemeClr val="accent1"/>
-          </a:lnRef>
-          <a:fillRef idx="3">
-            <a:schemeClr val="accent1"/>
-          </a:fillRef>
-          <a:effectRef idx="2">
-            <a:schemeClr val="accent1"/>
-          </a:effectRef>
-          <a:fontRef idx="minor">
-            <a:schemeClr val="lt1"/>
-          </a:fontRef>
-        </p:style>
-        <p:txBody>
-          <a:bodyPr rtlCol="0" anchor="ctr"/>
-          <a:lstStyle/>
-          <a:p>
-            <a:pPr algn="ctr"/>
-            <a:endParaRPr dirty="0"/>
-          </a:p>
-          <a:p>
-            <a:pPr algn="ctr">
-              <a:defRPr sz="6000" b="1">
-                <a:solidFill>
-                  <a:srgbClr val="000000"/>
-                </a:solidFill>
-              </a:defRPr>
-            </a:pPr>
-            <a:r>
-              <a:rPr lang="en-AU" dirty="0"/>
-              <a:t>Preliminary </a:t>
-            </a:r>
-            <a:r>
-              <a:rPr dirty="0"/>
-              <a:t>Results</a:t>
-            </a:r>
-          </a:p>
-        </p:txBody>
-      </p:sp>
-      <p:sp>
-        <p:nvSpPr>
-          <p:cNvPr id="7" name="Rounded Rectangle 6">
-            <a:extLst>
-              <a:ext uri="{FF2B5EF4-FFF2-40B4-BE49-F238E27FC236}">
-                <a16:creationId xmlns:a16="http://schemas.microsoft.com/office/drawing/2014/main" id="{9117D3FE-BFF7-611A-1B27-BB85545B11D8}"/>
-              </a:ext>
-            </a:extLst>
-          </p:cNvPr>
-          <p:cNvSpPr/>
-          <p:nvPr/>
-        </p:nvSpPr>
-        <p:spPr>
-          <a:xfrm>
-            <a:off x="24720000" y="3780000"/>
-            <a:ext cx="10560000" cy="10800000"/>
-          </a:xfrm>
-          <a:prstGeom prst="roundRect">
-            <a:avLst>
-              <a:gd name="adj" fmla="val 3409"/>
-            </a:avLst>
-          </a:prstGeom>
-          <a:solidFill>
-            <a:srgbClr val="FFFFFF"/>
-          </a:solidFill>
-          <a:ln w="19050">
-            <a:solidFill>
-              <a:srgbClr val="000000"/>
-            </a:solidFill>
-          </a:ln>
-        </p:spPr>
-        <p:style>
-          <a:lnRef idx="1">
-            <a:schemeClr val="accent1"/>
-          </a:lnRef>
-          <a:fillRef idx="3">
-            <a:schemeClr val="accent1"/>
-          </a:fillRef>
-          <a:effectRef idx="2">
-            <a:schemeClr val="accent1"/>
-          </a:effectRef>
-          <a:fontRef idx="minor">
-            <a:schemeClr val="lt1"/>
-          </a:fontRef>
-        </p:style>
-        <p:txBody>
-          <a:bodyPr rtlCol="0" anchor="t"/>
-          <a:lstStyle/>
-          <a:p>
-            <a:pPr algn="ctr"/>
-            <a:endParaRPr dirty="0"/>
-          </a:p>
-          <a:p>
-            <a:pPr algn="l">
-              <a:defRPr sz="3600">
-                <a:solidFill>
-                  <a:srgbClr val="000000"/>
-                </a:solidFill>
-              </a:defRPr>
-            </a:pPr>
-            <a:r>
-              <a:rPr dirty="0"/>
-              <a:t>- 10/10 cases discharged</a:t>
-            </a:r>
-            <a:br>
-              <a:rPr dirty="0"/>
-            </a:br>
-            <a:r>
-              <a:rPr dirty="0"/>
-              <a:t>- Avg cycle: 2s (IDE-friendly)</a:t>
-            </a:r>
-            <a:br>
-              <a:rPr dirty="0"/>
-            </a:br>
-            <a:br>
-              <a:rPr dirty="0"/>
-            </a:br>
-            <a:r>
-              <a:rPr dirty="0"/>
-              <a:t>[Table/Graph Placeholder]</a:t>
-            </a:r>
-          </a:p>
-        </p:txBody>
-      </p:sp>
-      <p:sp>
-        <p:nvSpPr>
-          <p:cNvPr id="8" name="TextBox 7">
-            <a:extLst>
-              <a:ext uri="{FF2B5EF4-FFF2-40B4-BE49-F238E27FC236}">
-                <a16:creationId xmlns:a16="http://schemas.microsoft.com/office/drawing/2014/main" id="{074AB810-47C2-6E65-BDA1-4E915955E69B}"/>
-              </a:ext>
-            </a:extLst>
-          </p:cNvPr>
-          <p:cNvSpPr txBox="1"/>
-          <p:nvPr/>
-        </p:nvSpPr>
-        <p:spPr>
-          <a:xfrm>
-            <a:off x="720000" y="15120000"/>
-            <a:ext cx="34560000" cy="3600000"/>
-          </a:xfrm>
-          <a:prstGeom prst="rect">
-            <a:avLst/>
-          </a:prstGeom>
-          <a:noFill/>
-        </p:spPr>
-        <p:txBody>
-          <a:bodyPr wrap="none" anchor="ctr">
-            <a:spAutoFit/>
-          </a:bodyPr>
-          <a:lstStyle/>
-          <a:p>
-            <a:endParaRPr/>
-          </a:p>
-          <a:p>
-            <a:pPr algn="ctr">
-              <a:defRPr sz="10000" b="1"/>
-            </a:pPr>
-            <a:r>
-              <a:t>Verifying Extract Method Refactoring in Rust</a:t>
-            </a:r>
-          </a:p>
-        </p:txBody>
-      </p:sp>
-      <p:sp>
-        <p:nvSpPr>
-          <p:cNvPr id="9" name="TextBox 8">
-            <a:extLst>
-              <a:ext uri="{FF2B5EF4-FFF2-40B4-BE49-F238E27FC236}">
-                <a16:creationId xmlns:a16="http://schemas.microsoft.com/office/drawing/2014/main" id="{457DFC22-F26B-8B07-6B53-C477591A1B39}"/>
-              </a:ext>
-            </a:extLst>
-          </p:cNvPr>
-          <p:cNvSpPr txBox="1"/>
-          <p:nvPr/>
-        </p:nvSpPr>
-        <p:spPr>
-          <a:xfrm>
-            <a:off x="720000" y="18000000"/>
-            <a:ext cx="34560000" cy="2160000"/>
-          </a:xfrm>
-          <a:prstGeom prst="rect">
-            <a:avLst/>
-          </a:prstGeom>
-          <a:noFill/>
-        </p:spPr>
-        <p:txBody>
-          <a:bodyPr wrap="none" anchor="ctr">
-            <a:spAutoFit/>
-          </a:bodyPr>
-          <a:lstStyle/>
-          <a:p>
-            <a:endParaRPr dirty="0"/>
-          </a:p>
-          <a:p>
-            <a:pPr algn="ctr">
-              <a:defRPr sz="6000" b="0"/>
-            </a:pPr>
-            <a:r>
-              <a:rPr dirty="0"/>
-              <a:t>Matthew Britton, Alex Potanin, Sasha Pak</a:t>
-            </a:r>
-          </a:p>
-        </p:txBody>
-      </p:sp>
-      <p:pic>
-        <p:nvPicPr>
-          <p:cNvPr id="10" name="Picture 9" descr="anu.png">
-            <a:extLst>
-              <a:ext uri="{FF2B5EF4-FFF2-40B4-BE49-F238E27FC236}">
-                <a16:creationId xmlns:a16="http://schemas.microsoft.com/office/drawing/2014/main" id="{61E5F29F-9A0D-3C02-4F43-1840D9971DF8}"/>
-              </a:ext>
-            </a:extLst>
-          </p:cNvPr>
-          <p:cNvPicPr>
-            <a:picLocks noChangeAspect="1"/>
-          </p:cNvPicPr>
-          <p:nvPr/>
-        </p:nvPicPr>
-        <p:blipFill>
-          <a:blip r:embed="rId3"/>
-          <a:stretch>
-            <a:fillRect/>
-          </a:stretch>
-        </p:blipFill>
-        <p:spPr>
-          <a:xfrm>
-            <a:off x="720000" y="15480000"/>
-            <a:ext cx="5400000" cy="3600000"/>
-          </a:xfrm>
-          <a:prstGeom prst="rect">
-            <a:avLst/>
-          </a:prstGeom>
-        </p:spPr>
-      </p:pic>
-      <p:pic>
-        <p:nvPicPr>
-          <p:cNvPr id="11" name="Picture 10" descr="splash25.png">
-            <a:extLst>
-              <a:ext uri="{FF2B5EF4-FFF2-40B4-BE49-F238E27FC236}">
-                <a16:creationId xmlns:a16="http://schemas.microsoft.com/office/drawing/2014/main" id="{81196893-681D-E69A-D33A-F3E9536587D7}"/>
-              </a:ext>
-            </a:extLst>
-          </p:cNvPr>
-          <p:cNvPicPr>
-            <a:picLocks noChangeAspect="1"/>
-          </p:cNvPicPr>
-          <p:nvPr/>
-        </p:nvPicPr>
-        <p:blipFill>
-          <a:blip r:embed="rId4"/>
-          <a:stretch>
-            <a:fillRect/>
-          </a:stretch>
-        </p:blipFill>
-        <p:spPr>
-          <a:xfrm>
-            <a:off x="31140000" y="15480000"/>
-            <a:ext cx="4320000" cy="3514405"/>
-          </a:xfrm>
-          <a:prstGeom prst="rect">
-            <a:avLst/>
-          </a:prstGeom>
-        </p:spPr>
-      </p:pic>
-      <p:sp>
-        <p:nvSpPr>
-          <p:cNvPr id="12" name="Rounded Rectangle 11">
-            <a:extLst>
-              <a:ext uri="{FF2B5EF4-FFF2-40B4-BE49-F238E27FC236}">
-                <a16:creationId xmlns:a16="http://schemas.microsoft.com/office/drawing/2014/main" id="{32C6B4FF-2618-260B-7827-B1D278EFF95F}"/>
-              </a:ext>
-            </a:extLst>
-          </p:cNvPr>
-          <p:cNvSpPr/>
-          <p:nvPr/>
-        </p:nvSpPr>
-        <p:spPr>
-          <a:xfrm>
-            <a:off x="720000" y="20880000"/>
-            <a:ext cx="10560000" cy="2880000"/>
-          </a:xfrm>
-          <a:prstGeom prst="roundRect">
-            <a:avLst>
-              <a:gd name="adj" fmla="val 3409"/>
-            </a:avLst>
-          </a:prstGeom>
-          <a:solidFill>
-            <a:srgbClr val="FFF5E1"/>
-          </a:solidFill>
-          <a:ln w="25400">
-            <a:solidFill>
-              <a:srgbClr val="000000"/>
-            </a:solidFill>
-          </a:ln>
-        </p:spPr>
-        <p:style>
-          <a:lnRef idx="1">
-            <a:schemeClr val="accent1"/>
-          </a:lnRef>
-          <a:fillRef idx="3">
-            <a:schemeClr val="accent1"/>
-          </a:fillRef>
-          <a:effectRef idx="2">
-            <a:schemeClr val="accent1"/>
-          </a:effectRef>
-          <a:fontRef idx="minor">
-            <a:schemeClr val="lt1"/>
-          </a:fontRef>
-        </p:style>
-        <p:txBody>
-          <a:bodyPr rtlCol="0" anchor="ctr"/>
-          <a:lstStyle/>
-          <a:p>
-            <a:pPr algn="ctr"/>
-            <a:endParaRPr dirty="0"/>
-          </a:p>
-          <a:p>
-            <a:pPr algn="ctr">
-              <a:defRPr sz="6000" b="1">
-                <a:solidFill>
-                  <a:srgbClr val="000000"/>
-                </a:solidFill>
-              </a:defRPr>
-            </a:pPr>
-            <a:r>
-              <a:rPr dirty="0"/>
-              <a:t>From Prototype to Production-Ready REM</a:t>
-            </a:r>
-          </a:p>
-        </p:txBody>
-      </p:sp>
-      <p:sp>
-        <p:nvSpPr>
-          <p:cNvPr id="13" name="Rounded Rectangle 12">
-            <a:extLst>
-              <a:ext uri="{FF2B5EF4-FFF2-40B4-BE49-F238E27FC236}">
-                <a16:creationId xmlns:a16="http://schemas.microsoft.com/office/drawing/2014/main" id="{96DE263D-47D2-DCAB-6E36-25F211BA91ED}"/>
-              </a:ext>
-            </a:extLst>
-          </p:cNvPr>
-          <p:cNvSpPr/>
-          <p:nvPr/>
-        </p:nvSpPr>
-        <p:spPr>
-          <a:xfrm>
-            <a:off x="720000" y="23940000"/>
-            <a:ext cx="10560000" cy="10800000"/>
-          </a:xfrm>
-          <a:prstGeom prst="roundRect">
-            <a:avLst>
-              <a:gd name="adj" fmla="val 3409"/>
-            </a:avLst>
-          </a:prstGeom>
-          <a:solidFill>
-            <a:srgbClr val="FFFFFF"/>
-          </a:solidFill>
-          <a:ln w="19050">
-            <a:solidFill>
-              <a:srgbClr val="000000"/>
-            </a:solidFill>
-          </a:ln>
-        </p:spPr>
-        <p:style>
-          <a:lnRef idx="1">
-            <a:schemeClr val="accent1"/>
-          </a:lnRef>
-          <a:fillRef idx="3">
-            <a:schemeClr val="accent1"/>
-          </a:fillRef>
-          <a:effectRef idx="2">
-            <a:schemeClr val="accent1"/>
-          </a:effectRef>
-          <a:fontRef idx="minor">
-            <a:schemeClr val="lt1"/>
-          </a:fontRef>
-        </p:style>
-        <p:txBody>
-          <a:bodyPr rtlCol="0" anchor="t"/>
-          <a:lstStyle/>
-          <a:p>
-            <a:pPr algn="ctr"/>
-            <a:endParaRPr dirty="0"/>
-          </a:p>
-        </p:txBody>
-      </p:sp>
-      <p:sp>
-        <p:nvSpPr>
-          <p:cNvPr id="14" name="Rounded Rectangle 13">
-            <a:extLst>
-              <a:ext uri="{FF2B5EF4-FFF2-40B4-BE49-F238E27FC236}">
-                <a16:creationId xmlns:a16="http://schemas.microsoft.com/office/drawing/2014/main" id="{DB66F33F-96EE-1B6E-E903-3F34FF8A1784}"/>
-              </a:ext>
-            </a:extLst>
-          </p:cNvPr>
-          <p:cNvSpPr/>
-          <p:nvPr/>
-        </p:nvSpPr>
-        <p:spPr>
-          <a:xfrm>
-            <a:off x="12720000" y="20880000"/>
-            <a:ext cx="10560000" cy="2880000"/>
-          </a:xfrm>
-          <a:prstGeom prst="roundRect">
-            <a:avLst>
-              <a:gd name="adj" fmla="val 3409"/>
-            </a:avLst>
-          </a:prstGeom>
-          <a:solidFill>
-            <a:srgbClr val="F0E6FF"/>
-          </a:solidFill>
-          <a:ln w="25400">
-            <a:solidFill>
-              <a:srgbClr val="000000"/>
-            </a:solidFill>
-          </a:ln>
-        </p:spPr>
-        <p:style>
-          <a:lnRef idx="1">
-            <a:schemeClr val="accent1"/>
-          </a:lnRef>
-          <a:fillRef idx="3">
-            <a:schemeClr val="accent1"/>
-          </a:fillRef>
-          <a:effectRef idx="2">
-            <a:schemeClr val="accent1"/>
-          </a:effectRef>
-          <a:fontRef idx="minor">
-            <a:schemeClr val="lt1"/>
-          </a:fontRef>
-        </p:style>
-        <p:txBody>
-          <a:bodyPr rtlCol="0" anchor="ctr"/>
-          <a:lstStyle/>
-          <a:p>
-            <a:pPr algn="ctr"/>
-            <a:endParaRPr/>
-          </a:p>
-          <a:p>
-            <a:pPr algn="ctr">
-              <a:defRPr sz="6000" b="1">
-                <a:solidFill>
-                  <a:srgbClr val="000000"/>
-                </a:solidFill>
-              </a:defRPr>
-            </a:pPr>
-            <a:r>
-              <a:t>Future Work</a:t>
-            </a:r>
-          </a:p>
-        </p:txBody>
-      </p:sp>
-      <p:sp>
-        <p:nvSpPr>
-          <p:cNvPr id="15" name="Rounded Rectangle 14">
-            <a:extLst>
-              <a:ext uri="{FF2B5EF4-FFF2-40B4-BE49-F238E27FC236}">
-                <a16:creationId xmlns:a16="http://schemas.microsoft.com/office/drawing/2014/main" id="{5DE43E1D-EE8A-5167-75B3-5CD2488A8E8B}"/>
-              </a:ext>
-            </a:extLst>
-          </p:cNvPr>
-          <p:cNvSpPr/>
-          <p:nvPr/>
-        </p:nvSpPr>
-        <p:spPr>
-          <a:xfrm>
-            <a:off x="12720000" y="23940000"/>
-            <a:ext cx="10560000" cy="10800000"/>
-          </a:xfrm>
-          <a:prstGeom prst="roundRect">
-            <a:avLst>
-              <a:gd name="adj" fmla="val 3409"/>
-            </a:avLst>
-          </a:prstGeom>
-          <a:solidFill>
-            <a:srgbClr val="FFFFFF"/>
-          </a:solidFill>
-          <a:ln w="19050">
-            <a:solidFill>
-              <a:srgbClr val="000000"/>
-            </a:solidFill>
-          </a:ln>
-        </p:spPr>
-        <p:style>
-          <a:lnRef idx="1">
-            <a:schemeClr val="accent1"/>
-          </a:lnRef>
-          <a:fillRef idx="3">
-            <a:schemeClr val="accent1"/>
-          </a:fillRef>
-          <a:effectRef idx="2">
-            <a:schemeClr val="accent1"/>
-          </a:effectRef>
-          <a:fontRef idx="minor">
-            <a:schemeClr val="lt1"/>
-          </a:fontRef>
-        </p:style>
-        <p:txBody>
-          <a:bodyPr rtlCol="0" anchor="t"/>
-          <a:lstStyle/>
-          <a:p>
-            <a:pPr algn="ctr"/>
-            <a:endParaRPr/>
-          </a:p>
-          <a:p>
-            <a:pPr algn="l">
-              <a:defRPr sz="3600">
-                <a:solidFill>
-                  <a:srgbClr val="000000"/>
-                </a:solidFill>
-              </a:defRPr>
-            </a:pPr>
-            <a:r>
-              <a:t>- Unsafe code</a:t>
-            </a:r>
-            <a:br/>
-            <a:r>
-              <a:t>- Concurrency</a:t>
-            </a:r>
-            <a:br/>
-            <a:r>
-              <a:t>- Large-scale evaluation</a:t>
-            </a:r>
-            <a:br/>
-            <a:r>
-              <a:t>- Better diagnostics</a:t>
-            </a:r>
-            <a:br/>
-            <a:r>
-              <a:t>- Scalable verification</a:t>
-            </a:r>
-          </a:p>
-        </p:txBody>
-      </p:sp>
-      <p:sp>
-        <p:nvSpPr>
-          <p:cNvPr id="16" name="Rounded Rectangle 15">
-            <a:extLst>
-              <a:ext uri="{FF2B5EF4-FFF2-40B4-BE49-F238E27FC236}">
-                <a16:creationId xmlns:a16="http://schemas.microsoft.com/office/drawing/2014/main" id="{A6414F45-0A3E-06B6-8EF2-89F48FF7DC7F}"/>
-              </a:ext>
-            </a:extLst>
-          </p:cNvPr>
-          <p:cNvSpPr/>
-          <p:nvPr/>
-        </p:nvSpPr>
-        <p:spPr>
-          <a:xfrm>
-            <a:off x="24720000" y="20880000"/>
-            <a:ext cx="10800000" cy="4140000"/>
-          </a:xfrm>
-          <a:prstGeom prst="roundRect">
-            <a:avLst/>
-          </a:prstGeom>
-          <a:solidFill>
-            <a:srgbClr val="800080"/>
-          </a:solidFill>
-          <a:ln>
-            <a:noFill/>
-          </a:ln>
-        </p:spPr>
-        <p:style>
-          <a:lnRef idx="1">
-            <a:schemeClr val="accent1"/>
-          </a:lnRef>
-          <a:fillRef idx="3">
-            <a:schemeClr val="accent1"/>
-          </a:fillRef>
-          <a:effectRef idx="2">
-            <a:schemeClr val="accent1"/>
-          </a:effectRef>
-          <a:fontRef idx="minor">
-            <a:schemeClr val="lt1"/>
-          </a:fontRef>
-        </p:style>
-        <p:txBody>
-          <a:bodyPr rtlCol="0" anchor="ctr"/>
-          <a:lstStyle/>
-          <a:p>
-            <a:pPr algn="ctr"/>
-            <a:endParaRPr/>
-          </a:p>
-        </p:txBody>
-      </p:sp>
-      <p:pic>
-        <p:nvPicPr>
-          <p:cNvPr id="17" name="Picture 16" descr="github.png">
-            <a:extLst>
-              <a:ext uri="{FF2B5EF4-FFF2-40B4-BE49-F238E27FC236}">
-                <a16:creationId xmlns:a16="http://schemas.microsoft.com/office/drawing/2014/main" id="{F4E03CFA-C81F-0591-766A-C404DB4FE528}"/>
-              </a:ext>
-            </a:extLst>
-          </p:cNvPr>
-          <p:cNvPicPr>
-            <a:picLocks noChangeAspect="1"/>
-          </p:cNvPicPr>
-          <p:nvPr/>
-        </p:nvPicPr>
-        <p:blipFill>
-          <a:blip r:embed="rId5"/>
-          <a:stretch>
-            <a:fillRect/>
-          </a:stretch>
-        </p:blipFill>
-        <p:spPr>
-          <a:xfrm>
-            <a:off x="31920000" y="21330000"/>
-            <a:ext cx="3240000" cy="3240000"/>
-          </a:xfrm>
-          <a:prstGeom prst="rect">
-            <a:avLst/>
-          </a:prstGeom>
-        </p:spPr>
-      </p:pic>
-      <p:sp>
-        <p:nvSpPr>
-          <p:cNvPr id="18" name="TextBox 17">
-            <a:extLst>
-              <a:ext uri="{FF2B5EF4-FFF2-40B4-BE49-F238E27FC236}">
-                <a16:creationId xmlns:a16="http://schemas.microsoft.com/office/drawing/2014/main" id="{E75654AA-A9F2-CF84-1CE7-F99CF38A79A8}"/>
-              </a:ext>
-            </a:extLst>
-          </p:cNvPr>
-          <p:cNvSpPr txBox="1"/>
-          <p:nvPr/>
-        </p:nvSpPr>
-        <p:spPr>
-          <a:xfrm>
-            <a:off x="25080000" y="20880000"/>
-            <a:ext cx="6480000" cy="4140000"/>
-          </a:xfrm>
-          <a:prstGeom prst="rect">
-            <a:avLst/>
-          </a:prstGeom>
-          <a:noFill/>
-        </p:spPr>
-        <p:txBody>
-          <a:bodyPr wrap="none" anchor="ctr">
-            <a:spAutoFit/>
-          </a:bodyPr>
-          <a:lstStyle/>
-          <a:p>
-            <a:endParaRPr/>
-          </a:p>
-          <a:p>
-            <a:pPr algn="l">
-              <a:defRPr sz="6000" b="1"/>
-            </a:pPr>
-            <a:r>
-              <a:rPr>
-                <a:solidFill>
-                  <a:srgbClr val="FFFFFF"/>
-                </a:solidFill>
-              </a:rPr>
-              <a:t>GitHub</a:t>
-            </a:r>
-          </a:p>
-        </p:txBody>
-      </p:sp>
-      <p:sp>
-        <p:nvSpPr>
-          <p:cNvPr id="19" name="Rounded Rectangle 18">
-            <a:extLst>
-              <a:ext uri="{FF2B5EF4-FFF2-40B4-BE49-F238E27FC236}">
-                <a16:creationId xmlns:a16="http://schemas.microsoft.com/office/drawing/2014/main" id="{E474E3A6-199B-A538-9687-7AD6F2B85CA5}"/>
-              </a:ext>
-            </a:extLst>
-          </p:cNvPr>
-          <p:cNvSpPr/>
-          <p:nvPr/>
-        </p:nvSpPr>
-        <p:spPr>
-          <a:xfrm>
-            <a:off x="24720000" y="25560000"/>
-            <a:ext cx="10800000" cy="4140000"/>
-          </a:xfrm>
-          <a:prstGeom prst="roundRect">
-            <a:avLst/>
-          </a:prstGeom>
-          <a:solidFill>
-            <a:srgbClr val="0066CC"/>
-          </a:solidFill>
-          <a:ln>
-            <a:noFill/>
-          </a:ln>
-        </p:spPr>
-        <p:style>
-          <a:lnRef idx="1">
-            <a:schemeClr val="accent1"/>
-          </a:lnRef>
-          <a:fillRef idx="3">
-            <a:schemeClr val="accent1"/>
-          </a:fillRef>
-          <a:effectRef idx="2">
-            <a:schemeClr val="accent1"/>
-          </a:effectRef>
-          <a:fontRef idx="minor">
-            <a:schemeClr val="lt1"/>
-          </a:fontRef>
-        </p:style>
-        <p:txBody>
-          <a:bodyPr rtlCol="0" anchor="ctr"/>
-          <a:lstStyle/>
-          <a:p>
-            <a:pPr algn="ctr"/>
-            <a:endParaRPr/>
-          </a:p>
-        </p:txBody>
-      </p:sp>
-      <p:pic>
-        <p:nvPicPr>
-          <p:cNvPr id="20" name="Picture 19" descr="vscode.png">
-            <a:extLst>
-              <a:ext uri="{FF2B5EF4-FFF2-40B4-BE49-F238E27FC236}">
-                <a16:creationId xmlns:a16="http://schemas.microsoft.com/office/drawing/2014/main" id="{090B201E-1C5B-5C59-444F-FA6F9154E8E6}"/>
-              </a:ext>
-            </a:extLst>
-          </p:cNvPr>
-          <p:cNvPicPr>
-            <a:picLocks noChangeAspect="1"/>
-          </p:cNvPicPr>
-          <p:nvPr/>
-        </p:nvPicPr>
-        <p:blipFill>
-          <a:blip r:embed="rId6"/>
-          <a:stretch>
-            <a:fillRect/>
-          </a:stretch>
-        </p:blipFill>
-        <p:spPr>
-          <a:xfrm>
-            <a:off x="31920000" y="26010000"/>
-            <a:ext cx="3240000" cy="3240000"/>
-          </a:xfrm>
-          <a:prstGeom prst="rect">
-            <a:avLst/>
-          </a:prstGeom>
-        </p:spPr>
-      </p:pic>
-      <p:sp>
-        <p:nvSpPr>
-          <p:cNvPr id="21" name="TextBox 20">
-            <a:extLst>
-              <a:ext uri="{FF2B5EF4-FFF2-40B4-BE49-F238E27FC236}">
-                <a16:creationId xmlns:a16="http://schemas.microsoft.com/office/drawing/2014/main" id="{0E2F24EB-CFB5-F511-168E-15EBD25834F7}"/>
-              </a:ext>
-            </a:extLst>
-          </p:cNvPr>
-          <p:cNvSpPr txBox="1"/>
-          <p:nvPr/>
-        </p:nvSpPr>
-        <p:spPr>
-          <a:xfrm>
-            <a:off x="25080000" y="25560000"/>
-            <a:ext cx="6480000" cy="4140000"/>
-          </a:xfrm>
-          <a:prstGeom prst="rect">
-            <a:avLst/>
-          </a:prstGeom>
-          <a:noFill/>
-        </p:spPr>
-        <p:txBody>
-          <a:bodyPr wrap="none" anchor="ctr">
-            <a:spAutoFit/>
-          </a:bodyPr>
-          <a:lstStyle/>
-          <a:p>
-            <a:endParaRPr/>
-          </a:p>
-          <a:p>
-            <a:pPr algn="l">
-              <a:defRPr sz="6000" b="1"/>
-            </a:pPr>
-            <a:r>
-              <a:rPr>
-                <a:solidFill>
-                  <a:srgbClr val="FFFFFF"/>
-                </a:solidFill>
-              </a:rPr>
-              <a:t>VSCode</a:t>
-            </a:r>
-          </a:p>
-        </p:txBody>
-      </p:sp>
-      <p:sp>
-        <p:nvSpPr>
-          <p:cNvPr id="22" name="Rounded Rectangle 21">
-            <a:extLst>
-              <a:ext uri="{FF2B5EF4-FFF2-40B4-BE49-F238E27FC236}">
-                <a16:creationId xmlns:a16="http://schemas.microsoft.com/office/drawing/2014/main" id="{2D800A69-4DB8-C7F5-AC04-1A3A362968E2}"/>
-              </a:ext>
-            </a:extLst>
-          </p:cNvPr>
-          <p:cNvSpPr/>
-          <p:nvPr/>
-        </p:nvSpPr>
-        <p:spPr>
-          <a:xfrm>
-            <a:off x="24720000" y="30240000"/>
-            <a:ext cx="10800000" cy="4140000"/>
-          </a:xfrm>
-          <a:prstGeom prst="roundRect">
-            <a:avLst/>
-          </a:prstGeom>
-          <a:solidFill>
-            <a:srgbClr val="000000"/>
-          </a:solidFill>
-          <a:ln>
-            <a:noFill/>
-          </a:ln>
-        </p:spPr>
-        <p:style>
-          <a:lnRef idx="1">
-            <a:schemeClr val="accent1"/>
-          </a:lnRef>
-          <a:fillRef idx="3">
-            <a:schemeClr val="accent1"/>
-          </a:fillRef>
-          <a:effectRef idx="2">
-            <a:schemeClr val="accent1"/>
-          </a:effectRef>
-          <a:fontRef idx="minor">
-            <a:schemeClr val="lt1"/>
-          </a:fontRef>
-        </p:style>
-        <p:txBody>
-          <a:bodyPr rtlCol="0" anchor="ctr"/>
-          <a:lstStyle/>
-          <a:p>
-            <a:pPr algn="ctr"/>
-            <a:endParaRPr/>
-          </a:p>
-        </p:txBody>
-      </p:sp>
-      <p:pic>
-        <p:nvPicPr>
-          <p:cNvPr id="23" name="Picture 22" descr="doi.png">
-            <a:extLst>
-              <a:ext uri="{FF2B5EF4-FFF2-40B4-BE49-F238E27FC236}">
-                <a16:creationId xmlns:a16="http://schemas.microsoft.com/office/drawing/2014/main" id="{566D10A1-54C3-58F6-1C1A-62C571FB1EC9}"/>
-              </a:ext>
-            </a:extLst>
-          </p:cNvPr>
-          <p:cNvPicPr>
-            <a:picLocks noChangeAspect="1"/>
-          </p:cNvPicPr>
-          <p:nvPr/>
-        </p:nvPicPr>
-        <p:blipFill>
-          <a:blip r:embed="rId7"/>
-          <a:stretch>
-            <a:fillRect/>
-          </a:stretch>
-        </p:blipFill>
-        <p:spPr>
-          <a:xfrm>
-            <a:off x="31920000" y="30690000"/>
-            <a:ext cx="3240000" cy="3240000"/>
-          </a:xfrm>
-          <a:prstGeom prst="rect">
-            <a:avLst/>
-          </a:prstGeom>
-        </p:spPr>
-      </p:pic>
-      <p:sp>
-        <p:nvSpPr>
-          <p:cNvPr id="24" name="TextBox 23">
-            <a:extLst>
-              <a:ext uri="{FF2B5EF4-FFF2-40B4-BE49-F238E27FC236}">
-                <a16:creationId xmlns:a16="http://schemas.microsoft.com/office/drawing/2014/main" id="{9C6FFD20-D485-2B4E-2037-02772038940C}"/>
-              </a:ext>
-            </a:extLst>
-          </p:cNvPr>
-          <p:cNvSpPr txBox="1"/>
-          <p:nvPr/>
-        </p:nvSpPr>
-        <p:spPr>
-          <a:xfrm>
-            <a:off x="25080000" y="30240000"/>
-            <a:ext cx="6480000" cy="4140000"/>
-          </a:xfrm>
-          <a:prstGeom prst="rect">
-            <a:avLst/>
-          </a:prstGeom>
-          <a:noFill/>
-        </p:spPr>
-        <p:txBody>
-          <a:bodyPr wrap="none" anchor="ctr">
-            <a:spAutoFit/>
-          </a:bodyPr>
-          <a:lstStyle/>
-          <a:p>
-            <a:endParaRPr/>
-          </a:p>
-          <a:p>
-            <a:pPr algn="l">
-              <a:defRPr sz="6000" b="1"/>
-            </a:pPr>
-            <a:r>
-              <a:rPr>
-                <a:solidFill>
-                  <a:srgbClr val="FFFFFF"/>
-                </a:solidFill>
-              </a:rPr>
-              <a:t>DOI</a:t>
-            </a:r>
-          </a:p>
-        </p:txBody>
-      </p:sp>
-      <p:sp>
-        <p:nvSpPr>
-          <p:cNvPr id="25" name="Rectangle: Rounded Corners 24">
-            <a:extLst>
-              <a:ext uri="{FF2B5EF4-FFF2-40B4-BE49-F238E27FC236}">
-                <a16:creationId xmlns:a16="http://schemas.microsoft.com/office/drawing/2014/main" id="{399189E3-09F4-5D34-6C34-084A3C81B68D}"/>
-              </a:ext>
-            </a:extLst>
-          </p:cNvPr>
-          <p:cNvSpPr/>
-          <p:nvPr/>
-        </p:nvSpPr>
-        <p:spPr>
-          <a:xfrm>
-            <a:off x="19685175" y="4077075"/>
-            <a:ext cx="2876550" cy="1466850"/>
-          </a:xfrm>
-          <a:prstGeom prst="roundRect">
-            <a:avLst/>
-          </a:prstGeom>
-          <a:solidFill>
-            <a:srgbClr val="F4A6A6"/>
-          </a:solidFill>
-        </p:spPr>
-        <p:style>
-          <a:lnRef idx="1">
-            <a:schemeClr val="accent2"/>
-          </a:lnRef>
-          <a:fillRef idx="2">
-            <a:schemeClr val="accent2"/>
-          </a:fillRef>
-          <a:effectRef idx="1">
-            <a:schemeClr val="accent2"/>
-          </a:effectRef>
-          <a:fontRef idx="minor">
-            <a:schemeClr val="dk1"/>
-          </a:fontRef>
-        </p:style>
-        <p:txBody>
-          <a:bodyPr rtlCol="0" anchor="ctr"/>
-          <a:lstStyle/>
-          <a:p>
-            <a:pPr algn="ctr"/>
-            <a:endParaRPr lang="en-AU" sz="2400" dirty="0"/>
-          </a:p>
-        </p:txBody>
-      </p:sp>
-      <p:sp>
-        <p:nvSpPr>
-          <p:cNvPr id="26" name="Rectangle: Rounded Corners 25">
-            <a:extLst>
-              <a:ext uri="{FF2B5EF4-FFF2-40B4-BE49-F238E27FC236}">
-                <a16:creationId xmlns:a16="http://schemas.microsoft.com/office/drawing/2014/main" id="{FA46F962-A43E-DE70-FDCE-0F607CAB1EBB}"/>
-              </a:ext>
-            </a:extLst>
-          </p:cNvPr>
-          <p:cNvSpPr/>
-          <p:nvPr/>
-        </p:nvSpPr>
-        <p:spPr>
-          <a:xfrm>
-            <a:off x="19685175" y="6246094"/>
-            <a:ext cx="2876550" cy="1466850"/>
-          </a:xfrm>
-          <a:prstGeom prst="roundRect">
-            <a:avLst/>
-          </a:prstGeom>
-          <a:solidFill>
-            <a:srgbClr val="FFD7A6"/>
-          </a:solidFill>
-        </p:spPr>
-        <p:style>
-          <a:lnRef idx="1">
-            <a:schemeClr val="accent2"/>
-          </a:lnRef>
-          <a:fillRef idx="2">
-            <a:schemeClr val="accent2"/>
-          </a:fillRef>
-          <a:effectRef idx="1">
-            <a:schemeClr val="accent2"/>
-          </a:effectRef>
-          <a:fontRef idx="minor">
-            <a:schemeClr val="dk1"/>
-          </a:fontRef>
-        </p:style>
-        <p:txBody>
-          <a:bodyPr rtlCol="0" anchor="ctr"/>
-          <a:lstStyle/>
-          <a:p>
-            <a:pPr algn="ctr"/>
-            <a:endParaRPr lang="en-AU" sz="2400" dirty="0"/>
-          </a:p>
-        </p:txBody>
-      </p:sp>
-      <p:sp>
-        <p:nvSpPr>
-          <p:cNvPr id="27" name="Rectangle: Rounded Corners 26">
-            <a:extLst>
-              <a:ext uri="{FF2B5EF4-FFF2-40B4-BE49-F238E27FC236}">
-                <a16:creationId xmlns:a16="http://schemas.microsoft.com/office/drawing/2014/main" id="{AA10D5F0-0D1A-BA15-8636-EB75BA561407}"/>
-              </a:ext>
-            </a:extLst>
-          </p:cNvPr>
-          <p:cNvSpPr/>
-          <p:nvPr/>
-        </p:nvSpPr>
-        <p:spPr>
-          <a:xfrm>
-            <a:off x="19685175" y="8415113"/>
-            <a:ext cx="2876550" cy="1466850"/>
-          </a:xfrm>
-          <a:prstGeom prst="roundRect">
-            <a:avLst/>
-          </a:prstGeom>
-          <a:solidFill>
-            <a:srgbClr val="FFF2A6"/>
-          </a:solidFill>
-        </p:spPr>
-        <p:style>
-          <a:lnRef idx="1">
-            <a:schemeClr val="accent2"/>
-          </a:lnRef>
-          <a:fillRef idx="2">
-            <a:schemeClr val="accent2"/>
-          </a:fillRef>
-          <a:effectRef idx="1">
-            <a:schemeClr val="accent2"/>
-          </a:effectRef>
-          <a:fontRef idx="minor">
-            <a:schemeClr val="dk1"/>
-          </a:fontRef>
-        </p:style>
-        <p:txBody>
-          <a:bodyPr rtlCol="0" anchor="ctr"/>
-          <a:lstStyle/>
-          <a:p>
-            <a:pPr algn="ctr"/>
-            <a:endParaRPr lang="en-AU" sz="2400" dirty="0"/>
-          </a:p>
-        </p:txBody>
-      </p:sp>
-      <p:sp>
-        <p:nvSpPr>
-          <p:cNvPr id="28" name="Rectangle: Rounded Corners 27">
-            <a:extLst>
-              <a:ext uri="{FF2B5EF4-FFF2-40B4-BE49-F238E27FC236}">
-                <a16:creationId xmlns:a16="http://schemas.microsoft.com/office/drawing/2014/main" id="{2A552A00-B73C-C66C-229E-8FFA32B17A43}"/>
-              </a:ext>
-            </a:extLst>
-          </p:cNvPr>
-          <p:cNvSpPr/>
-          <p:nvPr/>
-        </p:nvSpPr>
-        <p:spPr>
-          <a:xfrm>
-            <a:off x="19685175" y="10584132"/>
-            <a:ext cx="2876550" cy="1466850"/>
-          </a:xfrm>
-          <a:prstGeom prst="roundRect">
-            <a:avLst/>
-          </a:prstGeom>
-          <a:solidFill>
-            <a:srgbClr val="B9E6B9"/>
-          </a:solidFill>
-        </p:spPr>
-        <p:style>
-          <a:lnRef idx="1">
-            <a:schemeClr val="accent2"/>
-          </a:lnRef>
-          <a:fillRef idx="2">
-            <a:schemeClr val="accent2"/>
-          </a:fillRef>
-          <a:effectRef idx="1">
-            <a:schemeClr val="accent2"/>
-          </a:effectRef>
-          <a:fontRef idx="minor">
-            <a:schemeClr val="dk1"/>
-          </a:fontRef>
-        </p:style>
-        <p:txBody>
-          <a:bodyPr rtlCol="0" anchor="ctr"/>
-          <a:lstStyle/>
-          <a:p>
-            <a:pPr algn="ctr"/>
-            <a:endParaRPr lang="en-AU" sz="2400" dirty="0"/>
-          </a:p>
-        </p:txBody>
-      </p:sp>
-      <p:sp>
-        <p:nvSpPr>
-          <p:cNvPr id="29" name="Rectangle: Rounded Corners 28">
-            <a:extLst>
-              <a:ext uri="{FF2B5EF4-FFF2-40B4-BE49-F238E27FC236}">
-                <a16:creationId xmlns:a16="http://schemas.microsoft.com/office/drawing/2014/main" id="{969AE6BB-6194-DE13-FEED-3BCF6D7FF2D2}"/>
-              </a:ext>
-            </a:extLst>
-          </p:cNvPr>
-          <p:cNvSpPr/>
-          <p:nvPr/>
-        </p:nvSpPr>
-        <p:spPr>
-          <a:xfrm>
-            <a:off x="19685175" y="12753150"/>
-            <a:ext cx="2876550" cy="1466850"/>
-          </a:xfrm>
-          <a:prstGeom prst="roundRect">
-            <a:avLst/>
-          </a:prstGeom>
-          <a:solidFill>
-            <a:srgbClr val="A6D8F4"/>
-          </a:solidFill>
-        </p:spPr>
-        <p:style>
-          <a:lnRef idx="1">
-            <a:schemeClr val="accent2"/>
-          </a:lnRef>
-          <a:fillRef idx="2">
-            <a:schemeClr val="accent2"/>
-          </a:fillRef>
-          <a:effectRef idx="1">
-            <a:schemeClr val="accent2"/>
-          </a:effectRef>
-          <a:fontRef idx="minor">
-            <a:schemeClr val="dk1"/>
-          </a:fontRef>
-        </p:style>
-        <p:txBody>
-          <a:bodyPr rtlCol="0" anchor="ctr"/>
-          <a:lstStyle/>
-          <a:p>
-            <a:pPr algn="ctr"/>
-            <a:endParaRPr lang="en-AU" sz="2400" dirty="0"/>
-          </a:p>
-        </p:txBody>
-      </p:sp>
-      <p:cxnSp>
-        <p:nvCxnSpPr>
-          <p:cNvPr id="32" name="Straight Arrow Connector 31">
-            <a:extLst>
-              <a:ext uri="{FF2B5EF4-FFF2-40B4-BE49-F238E27FC236}">
-                <a16:creationId xmlns:a16="http://schemas.microsoft.com/office/drawing/2014/main" id="{3CCA1434-EB7D-3E1C-B128-6BE173DA8A7F}"/>
-              </a:ext>
-            </a:extLst>
-          </p:cNvPr>
-          <p:cNvCxnSpPr>
-            <a:stCxn id="25" idx="2"/>
-            <a:endCxn id="26" idx="0"/>
-          </p:cNvCxnSpPr>
-          <p:nvPr/>
-        </p:nvCxnSpPr>
-        <p:spPr>
-          <a:xfrm>
-            <a:off x="21123450" y="5543925"/>
-            <a:ext cx="0" cy="702169"/>
-          </a:xfrm>
-          <a:prstGeom prst="straightConnector1">
-            <a:avLst/>
-          </a:prstGeom>
-          <a:ln w="76200">
-            <a:solidFill>
-              <a:srgbClr val="F4A6A6"/>
-            </a:solidFill>
-            <a:tailEnd type="arrow"/>
-          </a:ln>
-        </p:spPr>
-        <p:style>
-          <a:lnRef idx="3">
-            <a:schemeClr val="accent1"/>
-          </a:lnRef>
-          <a:fillRef idx="0">
-            <a:schemeClr val="accent1"/>
-          </a:fillRef>
-          <a:effectRef idx="2">
-            <a:schemeClr val="accent1"/>
-          </a:effectRef>
-          <a:fontRef idx="minor">
-            <a:schemeClr val="tx1"/>
-          </a:fontRef>
-        </p:style>
-      </p:cxnSp>
-      <p:cxnSp>
-        <p:nvCxnSpPr>
-          <p:cNvPr id="33" name="Straight Arrow Connector 32">
-            <a:extLst>
-              <a:ext uri="{FF2B5EF4-FFF2-40B4-BE49-F238E27FC236}">
-                <a16:creationId xmlns:a16="http://schemas.microsoft.com/office/drawing/2014/main" id="{6755F09F-E961-B4CA-98D0-FC825C1B704A}"/>
-              </a:ext>
-            </a:extLst>
-          </p:cNvPr>
-          <p:cNvCxnSpPr/>
-          <p:nvPr/>
-        </p:nvCxnSpPr>
-        <p:spPr>
-          <a:xfrm>
-            <a:off x="21123450" y="7712944"/>
-            <a:ext cx="0" cy="702169"/>
-          </a:xfrm>
-          <a:prstGeom prst="straightConnector1">
-            <a:avLst/>
-          </a:prstGeom>
-          <a:ln w="76200">
-            <a:solidFill>
-              <a:srgbClr val="FFD7A6"/>
-            </a:solidFill>
-            <a:tailEnd type="arrow"/>
-          </a:ln>
-        </p:spPr>
-        <p:style>
-          <a:lnRef idx="2">
-            <a:schemeClr val="accent1"/>
-          </a:lnRef>
-          <a:fillRef idx="0">
-            <a:schemeClr val="accent1"/>
-          </a:fillRef>
-          <a:effectRef idx="1">
-            <a:schemeClr val="accent1"/>
-          </a:effectRef>
-          <a:fontRef idx="minor">
-            <a:schemeClr val="tx1"/>
-          </a:fontRef>
-        </p:style>
-      </p:cxnSp>
-      <p:cxnSp>
-        <p:nvCxnSpPr>
-          <p:cNvPr id="34" name="Straight Arrow Connector 33">
-            <a:extLst>
-              <a:ext uri="{FF2B5EF4-FFF2-40B4-BE49-F238E27FC236}">
-                <a16:creationId xmlns:a16="http://schemas.microsoft.com/office/drawing/2014/main" id="{C6FAA331-4031-F10D-7C01-D6E6CF04FB8A}"/>
-              </a:ext>
-            </a:extLst>
-          </p:cNvPr>
-          <p:cNvCxnSpPr/>
-          <p:nvPr/>
-        </p:nvCxnSpPr>
-        <p:spPr>
-          <a:xfrm>
-            <a:off x="21063300" y="9881963"/>
-            <a:ext cx="0" cy="702169"/>
-          </a:xfrm>
-          <a:prstGeom prst="straightConnector1">
-            <a:avLst/>
-          </a:prstGeom>
-          <a:ln w="76200">
-            <a:solidFill>
-              <a:srgbClr val="FFF2A6"/>
-            </a:solidFill>
-            <a:tailEnd type="arrow"/>
-          </a:ln>
-        </p:spPr>
-        <p:style>
-          <a:lnRef idx="2">
-            <a:schemeClr val="accent1"/>
-          </a:lnRef>
-          <a:fillRef idx="0">
-            <a:schemeClr val="accent1"/>
-          </a:fillRef>
-          <a:effectRef idx="1">
-            <a:schemeClr val="accent1"/>
-          </a:effectRef>
-          <a:fontRef idx="minor">
-            <a:schemeClr val="tx1"/>
-          </a:fontRef>
-        </p:style>
-      </p:cxnSp>
-      <p:cxnSp>
-        <p:nvCxnSpPr>
-          <p:cNvPr id="35" name="Straight Arrow Connector 34">
-            <a:extLst>
-              <a:ext uri="{FF2B5EF4-FFF2-40B4-BE49-F238E27FC236}">
-                <a16:creationId xmlns:a16="http://schemas.microsoft.com/office/drawing/2014/main" id="{DC767501-4F8C-D34D-84CD-C60722812253}"/>
-              </a:ext>
-            </a:extLst>
-          </p:cNvPr>
-          <p:cNvCxnSpPr/>
-          <p:nvPr/>
-        </p:nvCxnSpPr>
-        <p:spPr>
-          <a:xfrm>
-            <a:off x="21063300" y="12050982"/>
-            <a:ext cx="0" cy="702169"/>
-          </a:xfrm>
-          <a:prstGeom prst="straightConnector1">
-            <a:avLst/>
-          </a:prstGeom>
-          <a:ln w="76200">
-            <a:solidFill>
-              <a:srgbClr val="B9E6B9"/>
-            </a:solidFill>
-            <a:headEnd type="none" w="med" len="med"/>
-            <a:tailEnd type="arrow" w="med" len="med"/>
-          </a:ln>
-        </p:spPr>
-        <p:style>
-          <a:lnRef idx="2">
-            <a:schemeClr val="accent1"/>
-          </a:lnRef>
-          <a:fillRef idx="0">
-            <a:schemeClr val="accent1"/>
-          </a:fillRef>
-          <a:effectRef idx="1">
-            <a:schemeClr val="accent1"/>
-          </a:effectRef>
-          <a:fontRef idx="minor">
-            <a:schemeClr val="tx1"/>
-          </a:fontRef>
-        </p:style>
-      </p:cxnSp>
-    </p:spTree>
-    <p:extLst>
-      <p:ext uri="{BB962C8B-B14F-4D97-AF65-F5344CB8AC3E}">
-        <p14:creationId xmlns:p14="http://schemas.microsoft.com/office/powerpoint/2010/main" val="3656018760"/>
-      </p:ext>
-    </p:extLst>
-  </p:cSld>
-  <p:clrMapOvr>
-    <a:masterClrMapping/>
-  </p:clrMapOvr>
-</p:sld>
-</file>
-
 <file path=ppt/theme/theme1.xml><?xml version="1.0" encoding="utf-8"?>
 <a:theme xmlns:a="http://schemas.openxmlformats.org/drawingml/2006/main" name="Office Theme">
   <a:themeElements>

</xml_diff>

<commit_message>
poster just needs examples
</commit_message>
<xml_diff>
--- a/reports/splash_poster/working_copy.pptx
+++ b/reports/splash_poster/working_copy.pptx
@@ -302,7 +302,7 @@
           <a:p>
             <a:fld id="{5BCAD085-E8A6-8845-BD4E-CB4CCA059FC4}" type="datetimeFigureOut">
               <a:rPr lang="en-US" smtClean="0"/>
-              <a:t>9/19/2025</a:t>
+              <a:t>9/24/2025</a:t>
             </a:fld>
             <a:endParaRPr lang="en-US"/>
           </a:p>
@@ -470,7 +470,7 @@
           <a:p>
             <a:fld id="{5BCAD085-E8A6-8845-BD4E-CB4CCA059FC4}" type="datetimeFigureOut">
               <a:rPr lang="en-US" smtClean="0"/>
-              <a:t>9/19/2025</a:t>
+              <a:t>9/24/2025</a:t>
             </a:fld>
             <a:endParaRPr lang="en-US"/>
           </a:p>
@@ -648,7 +648,7 @@
           <a:p>
             <a:fld id="{5BCAD085-E8A6-8845-BD4E-CB4CCA059FC4}" type="datetimeFigureOut">
               <a:rPr lang="en-US" smtClean="0"/>
-              <a:t>9/19/2025</a:t>
+              <a:t>9/24/2025</a:t>
             </a:fld>
             <a:endParaRPr lang="en-US"/>
           </a:p>
@@ -816,7 +816,7 @@
           <a:p>
             <a:fld id="{5BCAD085-E8A6-8845-BD4E-CB4CCA059FC4}" type="datetimeFigureOut">
               <a:rPr lang="en-US" smtClean="0"/>
-              <a:t>9/19/2025</a:t>
+              <a:t>9/24/2025</a:t>
             </a:fld>
             <a:endParaRPr lang="en-US"/>
           </a:p>
@@ -1061,7 +1061,7 @@
           <a:p>
             <a:fld id="{5BCAD085-E8A6-8845-BD4E-CB4CCA059FC4}" type="datetimeFigureOut">
               <a:rPr lang="en-US" smtClean="0"/>
-              <a:t>9/19/2025</a:t>
+              <a:t>9/24/2025</a:t>
             </a:fld>
             <a:endParaRPr lang="en-US"/>
           </a:p>
@@ -1346,7 +1346,7 @@
           <a:p>
             <a:fld id="{5BCAD085-E8A6-8845-BD4E-CB4CCA059FC4}" type="datetimeFigureOut">
               <a:rPr lang="en-US" smtClean="0"/>
-              <a:t>9/19/2025</a:t>
+              <a:t>9/24/2025</a:t>
             </a:fld>
             <a:endParaRPr lang="en-US"/>
           </a:p>
@@ -1765,7 +1765,7 @@
           <a:p>
             <a:fld id="{5BCAD085-E8A6-8845-BD4E-CB4CCA059FC4}" type="datetimeFigureOut">
               <a:rPr lang="en-US" smtClean="0"/>
-              <a:t>9/19/2025</a:t>
+              <a:t>9/24/2025</a:t>
             </a:fld>
             <a:endParaRPr lang="en-US"/>
           </a:p>
@@ -1882,7 +1882,7 @@
           <a:p>
             <a:fld id="{5BCAD085-E8A6-8845-BD4E-CB4CCA059FC4}" type="datetimeFigureOut">
               <a:rPr lang="en-US" smtClean="0"/>
-              <a:t>9/19/2025</a:t>
+              <a:t>9/24/2025</a:t>
             </a:fld>
             <a:endParaRPr lang="en-US"/>
           </a:p>
@@ -1977,7 +1977,7 @@
           <a:p>
             <a:fld id="{5BCAD085-E8A6-8845-BD4E-CB4CCA059FC4}" type="datetimeFigureOut">
               <a:rPr lang="en-US" smtClean="0"/>
-              <a:t>9/19/2025</a:t>
+              <a:t>9/24/2025</a:t>
             </a:fld>
             <a:endParaRPr lang="en-US"/>
           </a:p>
@@ -2252,7 +2252,7 @@
           <a:p>
             <a:fld id="{5BCAD085-E8A6-8845-BD4E-CB4CCA059FC4}" type="datetimeFigureOut">
               <a:rPr lang="en-US" smtClean="0"/>
-              <a:t>9/19/2025</a:t>
+              <a:t>9/24/2025</a:t>
             </a:fld>
             <a:endParaRPr lang="en-US"/>
           </a:p>
@@ -2504,7 +2504,7 @@
           <a:p>
             <a:fld id="{5BCAD085-E8A6-8845-BD4E-CB4CCA059FC4}" type="datetimeFigureOut">
               <a:rPr lang="en-US" smtClean="0"/>
-              <a:t>9/19/2025</a:t>
+              <a:t>9/24/2025</a:t>
             </a:fld>
             <a:endParaRPr lang="en-US"/>
           </a:p>
@@ -2715,7 +2715,7 @@
           <a:p>
             <a:fld id="{5BCAD085-E8A6-8845-BD4E-CB4CCA059FC4}" type="datetimeFigureOut">
               <a:rPr lang="en-US" smtClean="0"/>
-              <a:t>9/19/2025</a:t>
+              <a:t>9/24/2025</a:t>
             </a:fld>
             <a:endParaRPr lang="en-US"/>
           </a:p>
@@ -4156,327 +4156,184 @@
           </a:p>
         </p:txBody>
       </p:sp>
-      <p:sp>
-        <p:nvSpPr>
-          <p:cNvPr id="16" name="Rounded Rectangle 15"/>
-          <p:cNvSpPr/>
+      <p:grpSp>
+        <p:nvGrpSpPr>
+          <p:cNvPr id="49" name="Group 48">
+            <a:extLst>
+              <a:ext uri="{FF2B5EF4-FFF2-40B4-BE49-F238E27FC236}">
+                <a16:creationId xmlns:a16="http://schemas.microsoft.com/office/drawing/2014/main" id="{549C7C7E-EF3B-0728-4F98-869F39FDEE8C}"/>
+              </a:ext>
+            </a:extLst>
+          </p:cNvPr>
+          <p:cNvGrpSpPr/>
           <p:nvPr/>
-        </p:nvSpPr>
-        <p:spPr>
+        </p:nvGrpSpPr>
+        <p:grpSpPr>
           <a:xfrm>
-            <a:off x="24720000" y="20880000"/>
-            <a:ext cx="10800000" cy="4140000"/>
+            <a:off x="24432397" y="29970000"/>
+            <a:ext cx="4827029" cy="4500001"/>
+            <a:chOff x="26879549" y="31086232"/>
+            <a:chExt cx="3941635" cy="3690000"/>
           </a:xfrm>
-          <a:prstGeom prst="roundRect">
-            <a:avLst/>
-          </a:prstGeom>
-          <a:solidFill>
-            <a:srgbClr val="800080"/>
-          </a:solidFill>
-          <a:ln>
-            <a:noFill/>
-          </a:ln>
-        </p:spPr>
-        <p:style>
-          <a:lnRef idx="1">
-            <a:schemeClr val="accent1"/>
-          </a:lnRef>
-          <a:fillRef idx="3">
-            <a:schemeClr val="accent1"/>
-          </a:fillRef>
-          <a:effectRef idx="2">
-            <a:schemeClr val="accent1"/>
-          </a:effectRef>
-          <a:fontRef idx="minor">
-            <a:schemeClr val="lt1"/>
-          </a:fontRef>
-        </p:style>
-        <p:txBody>
-          <a:bodyPr rtlCol="0" anchor="ctr"/>
-          <a:lstStyle/>
-          <a:p>
-            <a:pPr algn="ctr"/>
-            <a:endParaRPr/>
-          </a:p>
-        </p:txBody>
-      </p:sp>
-      <p:pic>
-        <p:nvPicPr>
-          <p:cNvPr id="17" name="Picture 16" descr="github.png"/>
-          <p:cNvPicPr>
-            <a:picLocks noChangeAspect="1"/>
-          </p:cNvPicPr>
+        </p:grpSpPr>
+        <p:sp>
+          <p:nvSpPr>
+            <p:cNvPr id="16" name="Rounded Rectangle 15"/>
+            <p:cNvSpPr/>
+            <p:nvPr/>
+          </p:nvSpPr>
+          <p:spPr>
+            <a:xfrm>
+              <a:off x="26879549" y="31086232"/>
+              <a:ext cx="3941635" cy="3690000"/>
+            </a:xfrm>
+            <a:prstGeom prst="roundRect">
+              <a:avLst/>
+            </a:prstGeom>
+            <a:solidFill>
+              <a:srgbClr val="800080"/>
+            </a:solidFill>
+            <a:ln>
+              <a:noFill/>
+            </a:ln>
+          </p:spPr>
+          <p:style>
+            <a:lnRef idx="1">
+              <a:schemeClr val="accent1"/>
+            </a:lnRef>
+            <a:fillRef idx="3">
+              <a:schemeClr val="accent1"/>
+            </a:fillRef>
+            <a:effectRef idx="2">
+              <a:schemeClr val="accent1"/>
+            </a:effectRef>
+            <a:fontRef idx="minor">
+              <a:schemeClr val="lt1"/>
+            </a:fontRef>
+          </p:style>
+          <p:txBody>
+            <a:bodyPr rtlCol="0" anchor="ctr"/>
+            <a:lstStyle/>
+            <a:p>
+              <a:pPr algn="ctr"/>
+              <a:endParaRPr/>
+            </a:p>
+          </p:txBody>
+        </p:sp>
+        <p:pic>
+          <p:nvPicPr>
+            <p:cNvPr id="17" name="Picture 16" descr="github.png"/>
+            <p:cNvPicPr>
+              <a:picLocks noChangeAspect="1"/>
+            </p:cNvPicPr>
+            <p:nvPr/>
+          </p:nvPicPr>
+          <p:blipFill>
+            <a:blip r:embed="rId5"/>
+            <a:stretch>
+              <a:fillRect/>
+            </a:stretch>
+          </p:blipFill>
+          <p:spPr>
+            <a:xfrm>
+              <a:off x="27230366" y="31311232"/>
+              <a:ext cx="3240000" cy="3240000"/>
+            </a:xfrm>
+            <a:prstGeom prst="rect">
+              <a:avLst/>
+            </a:prstGeom>
+          </p:spPr>
+        </p:pic>
+      </p:grpSp>
+      <p:grpSp>
+        <p:nvGrpSpPr>
+          <p:cNvPr id="48" name="Group 47">
+            <a:extLst>
+              <a:ext uri="{FF2B5EF4-FFF2-40B4-BE49-F238E27FC236}">
+                <a16:creationId xmlns:a16="http://schemas.microsoft.com/office/drawing/2014/main" id="{22966F89-37EB-C1B8-D4DC-CCDD384F0C37}"/>
+              </a:ext>
+            </a:extLst>
+          </p:cNvPr>
+          <p:cNvGrpSpPr/>
           <p:nvPr/>
-        </p:nvPicPr>
-        <p:blipFill>
-          <a:blip r:embed="rId5"/>
-          <a:stretch>
-            <a:fillRect/>
-          </a:stretch>
-        </p:blipFill>
-        <p:spPr>
+        </p:nvGrpSpPr>
+        <p:grpSpPr>
           <a:xfrm>
-            <a:off x="31920000" y="21330000"/>
-            <a:ext cx="3240000" cy="3240000"/>
+            <a:off x="30252453" y="29970000"/>
+            <a:ext cx="4699402" cy="4486800"/>
+            <a:chOff x="31318199" y="31086232"/>
+            <a:chExt cx="3941636" cy="3690000"/>
           </a:xfrm>
-          <a:prstGeom prst="rect">
-            <a:avLst/>
-          </a:prstGeom>
-        </p:spPr>
-      </p:pic>
-      <p:sp>
-        <p:nvSpPr>
-          <p:cNvPr id="18" name="TextBox 17"/>
-          <p:cNvSpPr txBox="1"/>
-          <p:nvPr/>
-        </p:nvSpPr>
-        <p:spPr>
-          <a:xfrm>
-            <a:off x="25080000" y="20880000"/>
-            <a:ext cx="6480000" cy="4140000"/>
-          </a:xfrm>
-          <a:prstGeom prst="rect">
-            <a:avLst/>
-          </a:prstGeom>
-          <a:noFill/>
-        </p:spPr>
-        <p:txBody>
-          <a:bodyPr wrap="none" anchor="ctr">
-            <a:spAutoFit/>
-          </a:bodyPr>
-          <a:lstStyle/>
-          <a:p>
-            <a:endParaRPr/>
-          </a:p>
-          <a:p>
-            <a:pPr algn="l">
-              <a:defRPr sz="6000" b="1"/>
-            </a:pPr>
-            <a:r>
-              <a:rPr>
-                <a:solidFill>
-                  <a:srgbClr val="FFFFFF"/>
-                </a:solidFill>
-              </a:rPr>
-              <a:t>GitHub</a:t>
-            </a:r>
-          </a:p>
-        </p:txBody>
-      </p:sp>
-      <p:sp>
-        <p:nvSpPr>
-          <p:cNvPr id="19" name="Rounded Rectangle 18"/>
-          <p:cNvSpPr/>
-          <p:nvPr/>
-        </p:nvSpPr>
-        <p:spPr>
-          <a:xfrm>
-            <a:off x="24720000" y="25560000"/>
-            <a:ext cx="10800000" cy="4140000"/>
-          </a:xfrm>
-          <a:prstGeom prst="roundRect">
-            <a:avLst/>
-          </a:prstGeom>
-          <a:solidFill>
-            <a:srgbClr val="0066CC"/>
-          </a:solidFill>
-          <a:ln>
-            <a:noFill/>
-          </a:ln>
-        </p:spPr>
-        <p:style>
-          <a:lnRef idx="1">
-            <a:schemeClr val="accent1"/>
-          </a:lnRef>
-          <a:fillRef idx="3">
-            <a:schemeClr val="accent1"/>
-          </a:fillRef>
-          <a:effectRef idx="2">
-            <a:schemeClr val="accent1"/>
-          </a:effectRef>
-          <a:fontRef idx="minor">
-            <a:schemeClr val="lt1"/>
-          </a:fontRef>
-        </p:style>
-        <p:txBody>
-          <a:bodyPr rtlCol="0" anchor="ctr"/>
-          <a:lstStyle/>
-          <a:p>
-            <a:pPr algn="ctr"/>
-            <a:endParaRPr/>
-          </a:p>
-        </p:txBody>
-      </p:sp>
-      <p:pic>
-        <p:nvPicPr>
-          <p:cNvPr id="20" name="Picture 19" descr="vscode.png"/>
-          <p:cNvPicPr>
-            <a:picLocks noChangeAspect="1"/>
-          </p:cNvPicPr>
-          <p:nvPr/>
-        </p:nvPicPr>
-        <p:blipFill>
-          <a:blip r:embed="rId6"/>
-          <a:stretch>
-            <a:fillRect/>
-          </a:stretch>
-        </p:blipFill>
-        <p:spPr>
-          <a:xfrm>
-            <a:off x="31920000" y="26010000"/>
-            <a:ext cx="3240000" cy="3240000"/>
-          </a:xfrm>
-          <a:prstGeom prst="rect">
-            <a:avLst/>
-          </a:prstGeom>
-        </p:spPr>
-      </p:pic>
-      <p:sp>
-        <p:nvSpPr>
-          <p:cNvPr id="21" name="TextBox 20"/>
-          <p:cNvSpPr txBox="1"/>
-          <p:nvPr/>
-        </p:nvSpPr>
-        <p:spPr>
-          <a:xfrm>
-            <a:off x="25080000" y="25560000"/>
-            <a:ext cx="6480000" cy="4140000"/>
-          </a:xfrm>
-          <a:prstGeom prst="rect">
-            <a:avLst/>
-          </a:prstGeom>
-          <a:noFill/>
-        </p:spPr>
-        <p:txBody>
-          <a:bodyPr wrap="none" anchor="ctr">
-            <a:spAutoFit/>
-          </a:bodyPr>
-          <a:lstStyle/>
-          <a:p>
-            <a:endParaRPr/>
-          </a:p>
-          <a:p>
-            <a:pPr algn="l">
-              <a:defRPr sz="6000" b="1"/>
-            </a:pPr>
-            <a:r>
-              <a:rPr>
-                <a:solidFill>
-                  <a:srgbClr val="FFFFFF"/>
-                </a:solidFill>
-              </a:rPr>
-              <a:t>VSCode</a:t>
-            </a:r>
-          </a:p>
-        </p:txBody>
-      </p:sp>
-      <p:sp>
-        <p:nvSpPr>
-          <p:cNvPr id="22" name="Rounded Rectangle 21"/>
-          <p:cNvSpPr/>
-          <p:nvPr/>
-        </p:nvSpPr>
-        <p:spPr>
-          <a:xfrm>
-            <a:off x="24720000" y="30240000"/>
-            <a:ext cx="10800000" cy="4140000"/>
-          </a:xfrm>
-          <a:prstGeom prst="roundRect">
-            <a:avLst/>
-          </a:prstGeom>
-          <a:solidFill>
-            <a:srgbClr val="000000"/>
-          </a:solidFill>
-          <a:ln>
-            <a:noFill/>
-          </a:ln>
-        </p:spPr>
-        <p:style>
-          <a:lnRef idx="1">
-            <a:schemeClr val="accent1"/>
-          </a:lnRef>
-          <a:fillRef idx="3">
-            <a:schemeClr val="accent1"/>
-          </a:fillRef>
-          <a:effectRef idx="2">
-            <a:schemeClr val="accent1"/>
-          </a:effectRef>
-          <a:fontRef idx="minor">
-            <a:schemeClr val="lt1"/>
-          </a:fontRef>
-        </p:style>
-        <p:txBody>
-          <a:bodyPr rtlCol="0" anchor="ctr"/>
-          <a:lstStyle/>
-          <a:p>
-            <a:pPr algn="ctr"/>
-            <a:endParaRPr/>
-          </a:p>
-        </p:txBody>
-      </p:sp>
-      <p:pic>
-        <p:nvPicPr>
-          <p:cNvPr id="23" name="Picture 22" descr="doi.png"/>
-          <p:cNvPicPr>
-            <a:picLocks noChangeAspect="1"/>
-          </p:cNvPicPr>
-          <p:nvPr/>
-        </p:nvPicPr>
-        <p:blipFill>
-          <a:blip r:embed="rId7"/>
-          <a:stretch>
-            <a:fillRect/>
-          </a:stretch>
-        </p:blipFill>
-        <p:spPr>
-          <a:xfrm>
-            <a:off x="31920000" y="30690000"/>
-            <a:ext cx="3240000" cy="3240000"/>
-          </a:xfrm>
-          <a:prstGeom prst="rect">
-            <a:avLst/>
-          </a:prstGeom>
-        </p:spPr>
-      </p:pic>
-      <p:sp>
-        <p:nvSpPr>
-          <p:cNvPr id="24" name="TextBox 23"/>
-          <p:cNvSpPr txBox="1"/>
-          <p:nvPr/>
-        </p:nvSpPr>
-        <p:spPr>
-          <a:xfrm>
-            <a:off x="25080000" y="30240000"/>
-            <a:ext cx="6480000" cy="4140000"/>
-          </a:xfrm>
-          <a:prstGeom prst="rect">
-            <a:avLst/>
-          </a:prstGeom>
-          <a:noFill/>
-        </p:spPr>
-        <p:txBody>
-          <a:bodyPr wrap="none" anchor="ctr">
-            <a:spAutoFit/>
-          </a:bodyPr>
-          <a:lstStyle/>
-          <a:p>
-            <a:endParaRPr/>
-          </a:p>
-          <a:p>
-            <a:pPr algn="l">
-              <a:defRPr sz="6000" b="1"/>
-            </a:pPr>
-            <a:r>
-              <a:rPr>
-                <a:solidFill>
-                  <a:srgbClr val="FFFFFF"/>
-                </a:solidFill>
-              </a:rPr>
-              <a:t>DOI</a:t>
-            </a:r>
-          </a:p>
-        </p:txBody>
-      </p:sp>
+        </p:grpSpPr>
+        <p:sp>
+          <p:nvSpPr>
+            <p:cNvPr id="19" name="Rounded Rectangle 18"/>
+            <p:cNvSpPr/>
+            <p:nvPr/>
+          </p:nvSpPr>
+          <p:spPr>
+            <a:xfrm>
+              <a:off x="31318199" y="31086232"/>
+              <a:ext cx="3941636" cy="3690000"/>
+            </a:xfrm>
+            <a:prstGeom prst="roundRect">
+              <a:avLst/>
+            </a:prstGeom>
+            <a:solidFill>
+              <a:srgbClr val="0066CC"/>
+            </a:solidFill>
+            <a:ln>
+              <a:noFill/>
+            </a:ln>
+          </p:spPr>
+          <p:style>
+            <a:lnRef idx="1">
+              <a:schemeClr val="accent1"/>
+            </a:lnRef>
+            <a:fillRef idx="3">
+              <a:schemeClr val="accent1"/>
+            </a:fillRef>
+            <a:effectRef idx="2">
+              <a:schemeClr val="accent1"/>
+            </a:effectRef>
+            <a:fontRef idx="minor">
+              <a:schemeClr val="lt1"/>
+            </a:fontRef>
+          </p:style>
+          <p:txBody>
+            <a:bodyPr rtlCol="0" anchor="ctr"/>
+            <a:lstStyle/>
+            <a:p>
+              <a:pPr algn="ctr"/>
+              <a:endParaRPr/>
+            </a:p>
+          </p:txBody>
+        </p:sp>
+        <p:pic>
+          <p:nvPicPr>
+            <p:cNvPr id="20" name="Picture 19" descr="vscode.png"/>
+            <p:cNvPicPr>
+              <a:picLocks noChangeAspect="1"/>
+            </p:cNvPicPr>
+            <p:nvPr/>
+          </p:nvPicPr>
+          <p:blipFill>
+            <a:blip r:embed="rId6"/>
+            <a:stretch>
+              <a:fillRect/>
+            </a:stretch>
+          </p:blipFill>
+          <p:spPr>
+            <a:xfrm>
+              <a:off x="31669017" y="31311232"/>
+              <a:ext cx="3240000" cy="3240000"/>
+            </a:xfrm>
+            <a:prstGeom prst="rect">
+              <a:avLst/>
+            </a:prstGeom>
+          </p:spPr>
+        </p:pic>
+      </p:grpSp>
       <p:sp>
         <p:nvSpPr>
           <p:cNvPr id="25" name="Rectangle: Rounded Corners 24">
@@ -5428,8 +5285,8 @@
           </a:p>
         </p:txBody>
       </p:sp>
-      <mc:AlternateContent xmlns:mc="http://schemas.openxmlformats.org/markup-compatibility/2006" xmlns:a14="http://schemas.microsoft.com/office/drawing/2010/main">
-        <mc:Choice Requires="a14">
+      <mc:AlternateContent xmlns:mc="http://schemas.openxmlformats.org/markup-compatibility/2006">
+        <mc:Choice xmlns:a14="http://schemas.microsoft.com/office/drawing/2010/main" Requires="a14">
           <p:sp>
             <p:nvSpPr>
               <p:cNvPr id="39" name="Rectangle: Rounded Corners 38">
@@ -5498,7 +5355,6 @@
                 <a:endParaRPr lang="en-AU" b="1" dirty="0"/>
               </a:p>
               <a:p>
-                <a:pPr/>
                 <a14:m>
                   <m:oMathPara xmlns:m="http://schemas.openxmlformats.org/officeDocument/2006/math">
                     <m:oMathParaPr>
@@ -5506,296 +5362,104 @@
                     </m:oMathParaPr>
                     <m:oMath xmlns:m="http://schemas.openxmlformats.org/officeDocument/2006/math">
                       <m:r>
-                        <a:rPr lang="en-AU" sz="2800" b="1" i="1" smtClean="0">
+                        <a:rPr lang="en-AU" sz="3200" b="1" i="1" smtClean="0">
                           <a:latin typeface="Cambria Math" panose="02040503050406030204" pitchFamily="18" charset="0"/>
                         </a:rPr>
                         <m:t>∀</m:t>
                       </m:r>
                       <m:r>
-                        <a:rPr lang="en-AU" sz="2800" b="1" i="1" smtClean="0">
+                        <a:rPr lang="en-AU" sz="3200" b="1" i="1" smtClean="0">
                           <a:latin typeface="Cambria Math" panose="02040503050406030204" pitchFamily="18" charset="0"/>
                         </a:rPr>
                         <m:t>𝒙</m:t>
                       </m:r>
                       <m:r>
-                        <a:rPr lang="en-AU" sz="2800" b="1" i="1" smtClean="0">
+                        <a:rPr lang="en-AU" sz="3200" b="1" i="1" smtClean="0">
                           <a:latin typeface="Cambria Math" panose="02040503050406030204" pitchFamily="18" charset="0"/>
                         </a:rPr>
-                        <m:t>.</m:t>
+                        <m:t>. </m:t>
                       </m:r>
                       <m:r>
-                        <a:rPr lang="en-AU" sz="2800" b="1" i="0" smtClean="0">
+                        <a:rPr lang="en-AU" sz="3200" b="1" i="1" smtClean="0">
                           <a:latin typeface="Cambria Math" panose="02040503050406030204" pitchFamily="18" charset="0"/>
                         </a:rPr>
-                        <m:t>𝚽</m:t>
+                        <m:t>𝒕𝒓</m:t>
                       </m:r>
-                      <m:d>
-                        <m:dPr>
-                          <m:ctrlPr>
-                            <a:rPr lang="en-AU" sz="2800" b="1" i="1" smtClean="0">
-                              <a:latin typeface="Cambria Math" panose="02040503050406030204" pitchFamily="18" charset="0"/>
-                            </a:rPr>
-                          </m:ctrlPr>
-                        </m:dPr>
-                        <m:e>
-                          <m:r>
-                            <a:rPr lang="en-AU" sz="2800" b="1" i="1" smtClean="0">
-                              <a:latin typeface="Cambria Math" panose="02040503050406030204" pitchFamily="18" charset="0"/>
-                            </a:rPr>
-                            <m:t>𝒙</m:t>
-                          </m:r>
-                          <m:r>
-                            <a:rPr lang="en-AU" sz="2800" b="1" i="1" smtClean="0">
-                              <a:latin typeface="Cambria Math" panose="02040503050406030204" pitchFamily="18" charset="0"/>
-                            </a:rPr>
-                            <m:t> </m:t>
-                          </m:r>
-                        </m:e>
-                      </m:d>
                       <m:r>
-                        <a:rPr lang="en-AU" sz="2800" b="1" i="1" smtClean="0">
+                        <a:rPr lang="en-AU" sz="3200" b="1" i="1" smtClean="0">
                           <a:latin typeface="Cambria Math" panose="02040503050406030204" pitchFamily="18" charset="0"/>
-                          <a:ea typeface="Cambria Math" panose="02040503050406030204" pitchFamily="18" charset="0"/>
                         </a:rPr>
-                        <m:t>⟹</m:t>
+                        <m:t>(</m:t>
                       </m:r>
-                      <m:d>
-                        <m:dPr>
-                          <m:ctrlPr>
-                            <a:rPr lang="en-AU" sz="2800" b="1" i="1" smtClean="0">
-                              <a:latin typeface="Cambria Math" panose="02040503050406030204" pitchFamily="18" charset="0"/>
-                              <a:ea typeface="Cambria Math" panose="02040503050406030204" pitchFamily="18" charset="0"/>
-                            </a:rPr>
-                          </m:ctrlPr>
-                        </m:dPr>
-                        <m:e>
-                          <m:sSub>
-                            <m:sSubPr>
-                              <m:ctrlPr>
-                                <a:rPr lang="en-AU" sz="2800" b="1" i="1" smtClean="0">
-                                  <a:latin typeface="Cambria Math" panose="02040503050406030204" pitchFamily="18" charset="0"/>
-                                  <a:ea typeface="Cambria Math" panose="02040503050406030204" pitchFamily="18" charset="0"/>
-                                </a:rPr>
-                              </m:ctrlPr>
-                            </m:sSubPr>
-                            <m:e>
-                              <m:r>
-                                <a:rPr lang="en-AU" sz="2800" b="1" i="1" smtClean="0">
-                                  <a:latin typeface="Cambria Math" panose="02040503050406030204" pitchFamily="18" charset="0"/>
-                                  <a:ea typeface="Cambria Math" panose="02040503050406030204" pitchFamily="18" charset="0"/>
-                                </a:rPr>
-                                <m:t>𝒇</m:t>
-                              </m:r>
-                            </m:e>
-                            <m:sub>
-                              <m:r>
-                                <a:rPr lang="en-AU" sz="2800" b="1" i="1" smtClean="0">
-                                  <a:latin typeface="Cambria Math" panose="02040503050406030204" pitchFamily="18" charset="0"/>
-                                  <a:ea typeface="Cambria Math" panose="02040503050406030204" pitchFamily="18" charset="0"/>
-                                </a:rPr>
-                                <m:t>𝑷</m:t>
-                              </m:r>
-                            </m:sub>
-                          </m:sSub>
-                          <m:d>
-                            <m:dPr>
-                              <m:ctrlPr>
-                                <a:rPr lang="en-AU" sz="2800" b="1" i="1" smtClean="0">
-                                  <a:latin typeface="Cambria Math" panose="02040503050406030204" pitchFamily="18" charset="0"/>
-                                  <a:ea typeface="Cambria Math" panose="02040503050406030204" pitchFamily="18" charset="0"/>
-                                </a:rPr>
-                              </m:ctrlPr>
-                            </m:dPr>
-                            <m:e>
-                              <m:r>
-                                <a:rPr lang="en-AU" sz="2800" b="1" i="1" smtClean="0">
-                                  <a:latin typeface="Cambria Math" panose="02040503050406030204" pitchFamily="18" charset="0"/>
-                                  <a:ea typeface="Cambria Math" panose="02040503050406030204" pitchFamily="18" charset="0"/>
-                                </a:rPr>
-                                <m:t>𝒙</m:t>
-                              </m:r>
-                            </m:e>
-                          </m:d>
-                          <m:r>
-                            <a:rPr lang="en-AU" sz="2800" b="1" i="1" smtClean="0">
-                              <a:latin typeface="Cambria Math" panose="02040503050406030204" pitchFamily="18" charset="0"/>
-                              <a:ea typeface="Cambria Math" panose="02040503050406030204" pitchFamily="18" charset="0"/>
-                            </a:rPr>
-                            <m:t>=</m:t>
-                          </m:r>
-                          <m:sSub>
-                            <m:sSubPr>
-                              <m:ctrlPr>
-                                <a:rPr lang="en-AU" sz="2800" b="1" i="1" smtClean="0">
-                                  <a:latin typeface="Cambria Math" panose="02040503050406030204" pitchFamily="18" charset="0"/>
-                                  <a:ea typeface="Cambria Math" panose="02040503050406030204" pitchFamily="18" charset="0"/>
-                                </a:rPr>
-                              </m:ctrlPr>
-                            </m:sSubPr>
-                            <m:e>
-                              <m:r>
-                                <a:rPr lang="en-AU" sz="2800" b="1" i="1" smtClean="0">
-                                  <a:latin typeface="Cambria Math" panose="02040503050406030204" pitchFamily="18" charset="0"/>
-                                  <a:ea typeface="Cambria Math" panose="02040503050406030204" pitchFamily="18" charset="0"/>
-                                </a:rPr>
-                                <m:t>𝒇</m:t>
-                              </m:r>
-                            </m:e>
-                            <m:sub>
-                              <m:sSup>
-                                <m:sSupPr>
-                                  <m:ctrlPr>
-                                    <a:rPr lang="en-AU" sz="2800" b="1" i="1" smtClean="0">
-                                      <a:latin typeface="Cambria Math" panose="02040503050406030204" pitchFamily="18" charset="0"/>
-                                      <a:ea typeface="Cambria Math" panose="02040503050406030204" pitchFamily="18" charset="0"/>
-                                    </a:rPr>
-                                  </m:ctrlPr>
-                                </m:sSupPr>
-                                <m:e>
-                                  <m:r>
-                                    <a:rPr lang="en-AU" sz="2800" b="1" i="1" smtClean="0">
-                                      <a:latin typeface="Cambria Math" panose="02040503050406030204" pitchFamily="18" charset="0"/>
-                                      <a:ea typeface="Cambria Math" panose="02040503050406030204" pitchFamily="18" charset="0"/>
-                                    </a:rPr>
-                                    <m:t>𝑷</m:t>
-                                  </m:r>
-                                </m:e>
-                                <m:sup>
-                                  <m:r>
-                                    <a:rPr lang="en-AU" sz="2800" b="1" i="1" smtClean="0">
-                                      <a:latin typeface="Cambria Math" panose="02040503050406030204" pitchFamily="18" charset="0"/>
-                                      <a:ea typeface="Cambria Math" panose="02040503050406030204" pitchFamily="18" charset="0"/>
-                                    </a:rPr>
-                                    <m:t>′</m:t>
-                                  </m:r>
-                                </m:sup>
-                              </m:sSup>
-                            </m:sub>
-                          </m:sSub>
-                          <m:d>
-                            <m:dPr>
-                              <m:ctrlPr>
-                                <a:rPr lang="en-AU" sz="2800" b="1" i="1" smtClean="0">
-                                  <a:latin typeface="Cambria Math" panose="02040503050406030204" pitchFamily="18" charset="0"/>
-                                  <a:ea typeface="Cambria Math" panose="02040503050406030204" pitchFamily="18" charset="0"/>
-                                </a:rPr>
-                              </m:ctrlPr>
-                            </m:dPr>
-                            <m:e>
-                              <m:r>
-                                <a:rPr lang="en-AU" sz="2800" b="1" i="1" smtClean="0">
-                                  <a:latin typeface="Cambria Math" panose="02040503050406030204" pitchFamily="18" charset="0"/>
-                                  <a:ea typeface="Cambria Math" panose="02040503050406030204" pitchFamily="18" charset="0"/>
-                                </a:rPr>
-                                <m:t>𝒙</m:t>
-                              </m:r>
-                            </m:e>
-                          </m:d>
-                          <m:r>
-                            <a:rPr lang="en-AU" sz="2800" b="1" i="1" smtClean="0">
-                              <a:latin typeface="Cambria Math" panose="02040503050406030204" pitchFamily="18" charset="0"/>
-                              <a:ea typeface="Cambria Math" panose="02040503050406030204" pitchFamily="18" charset="0"/>
-                            </a:rPr>
-                            <m:t>∧</m:t>
-                          </m:r>
-                          <m:r>
-                            <a:rPr lang="en-AU" sz="2800" b="1" i="1" smtClean="0">
-                              <a:latin typeface="Cambria Math" panose="02040503050406030204" pitchFamily="18" charset="0"/>
-                              <a:ea typeface="Cambria Math" panose="02040503050406030204" pitchFamily="18" charset="0"/>
-                            </a:rPr>
-                            <m:t>𝒐𝒃𝒔</m:t>
-                          </m:r>
-                          <m:d>
-                            <m:dPr>
-                              <m:ctrlPr>
-                                <a:rPr lang="en-AU" sz="2800" b="1" i="1" smtClean="0">
-                                  <a:latin typeface="Cambria Math" panose="02040503050406030204" pitchFamily="18" charset="0"/>
-                                  <a:ea typeface="Cambria Math" panose="02040503050406030204" pitchFamily="18" charset="0"/>
-                                </a:rPr>
-                              </m:ctrlPr>
-                            </m:dPr>
-                            <m:e>
-                              <m:r>
-                                <a:rPr lang="en-AU" sz="2800" b="1" i="1" smtClean="0">
-                                  <a:latin typeface="Cambria Math" panose="02040503050406030204" pitchFamily="18" charset="0"/>
-                                  <a:ea typeface="Cambria Math" panose="02040503050406030204" pitchFamily="18" charset="0"/>
-                                </a:rPr>
-                                <m:t>𝝉</m:t>
-                              </m:r>
-                            </m:e>
-                          </m:d>
-                          <m:r>
-                            <a:rPr lang="en-AU" sz="2800" b="1" i="1" smtClean="0">
-                              <a:latin typeface="Cambria Math" panose="02040503050406030204" pitchFamily="18" charset="0"/>
-                              <a:ea typeface="Cambria Math" panose="02040503050406030204" pitchFamily="18" charset="0"/>
-                            </a:rPr>
-                            <m:t>=</m:t>
-                          </m:r>
-                          <m:r>
-                            <a:rPr lang="en-AU" sz="2800" b="1" i="1" smtClean="0">
-                              <a:latin typeface="Cambria Math" panose="02040503050406030204" pitchFamily="18" charset="0"/>
-                              <a:ea typeface="Cambria Math" panose="02040503050406030204" pitchFamily="18" charset="0"/>
-                            </a:rPr>
-                            <m:t>𝒐𝒃𝒔</m:t>
-                          </m:r>
-                          <m:d>
-                            <m:dPr>
-                              <m:ctrlPr>
-                                <a:rPr lang="en-AU" sz="2800" b="1" i="1" smtClean="0">
-                                  <a:latin typeface="Cambria Math" panose="02040503050406030204" pitchFamily="18" charset="0"/>
-                                  <a:ea typeface="Cambria Math" panose="02040503050406030204" pitchFamily="18" charset="0"/>
-                                </a:rPr>
-                              </m:ctrlPr>
-                            </m:dPr>
-                            <m:e>
-                              <m:sSup>
-                                <m:sSupPr>
-                                  <m:ctrlPr>
-                                    <a:rPr lang="en-AU" sz="2800" b="1" i="1" smtClean="0">
-                                      <a:latin typeface="Cambria Math" panose="02040503050406030204" pitchFamily="18" charset="0"/>
-                                      <a:ea typeface="Cambria Math" panose="02040503050406030204" pitchFamily="18" charset="0"/>
-                                    </a:rPr>
-                                  </m:ctrlPr>
-                                </m:sSupPr>
-                                <m:e>
-                                  <m:r>
-                                    <a:rPr lang="en-AU" sz="2800" b="1" i="1" smtClean="0">
-                                      <a:latin typeface="Cambria Math" panose="02040503050406030204" pitchFamily="18" charset="0"/>
-                                      <a:ea typeface="Cambria Math" panose="02040503050406030204" pitchFamily="18" charset="0"/>
-                                    </a:rPr>
-                                    <m:t>𝝉</m:t>
-                                  </m:r>
-                                </m:e>
-                                <m:sup>
-                                  <m:r>
-                                    <a:rPr lang="en-AU" sz="2800" b="1" i="1" smtClean="0">
-                                      <a:latin typeface="Cambria Math" panose="02040503050406030204" pitchFamily="18" charset="0"/>
-                                      <a:ea typeface="Cambria Math" panose="02040503050406030204" pitchFamily="18" charset="0"/>
-                                    </a:rPr>
-                                    <m:t>′</m:t>
-                                  </m:r>
-                                </m:sup>
-                              </m:sSup>
-                            </m:e>
-                          </m:d>
-                        </m:e>
-                      </m:d>
                       <m:r>
-                        <a:rPr lang="en-AU" sz="2800" b="1" i="1" smtClean="0">
+                        <a:rPr lang="en-AU" sz="3200" b="1" i="1" smtClean="0">
                           <a:latin typeface="Cambria Math" panose="02040503050406030204" pitchFamily="18" charset="0"/>
-                          <a:ea typeface="Cambria Math" panose="02040503050406030204" pitchFamily="18" charset="0"/>
                         </a:rPr>
-                        <m:t> </m:t>
+                        <m:t>𝑷</m:t>
+                      </m:r>
+                      <m:r>
+                        <a:rPr lang="en-AU" sz="3200" b="1" i="1" smtClean="0">
+                          <a:latin typeface="Cambria Math" panose="02040503050406030204" pitchFamily="18" charset="0"/>
+                        </a:rPr>
+                        <m:t>)(</m:t>
+                      </m:r>
+                      <m:r>
+                        <a:rPr lang="en-AU" sz="3200" b="1" i="1" smtClean="0">
+                          <a:latin typeface="Cambria Math" panose="02040503050406030204" pitchFamily="18" charset="0"/>
+                        </a:rPr>
+                        <m:t>𝒙</m:t>
+                      </m:r>
+                      <m:r>
+                        <a:rPr lang="en-AU" sz="3200" b="1" i="1" smtClean="0">
+                          <a:latin typeface="Cambria Math" panose="02040503050406030204" pitchFamily="18" charset="0"/>
+                        </a:rPr>
+                        <m:t>) = </m:t>
+                      </m:r>
+                      <m:r>
+                        <a:rPr lang="en-AU" sz="3200" b="1" i="1" smtClean="0">
+                          <a:latin typeface="Cambria Math" panose="02040503050406030204" pitchFamily="18" charset="0"/>
+                        </a:rPr>
+                        <m:t>𝒕𝒓</m:t>
+                      </m:r>
+                      <m:r>
+                        <a:rPr lang="en-AU" sz="3200" b="1" i="1" smtClean="0">
+                          <a:latin typeface="Cambria Math" panose="02040503050406030204" pitchFamily="18" charset="0"/>
+                        </a:rPr>
+                        <m:t>(</m:t>
+                      </m:r>
+                      <m:r>
+                        <a:rPr lang="en-AU" sz="3200" b="1" i="1" smtClean="0">
+                          <a:latin typeface="Cambria Math" panose="02040503050406030204" pitchFamily="18" charset="0"/>
+                        </a:rPr>
+                        <m:t>𝑷</m:t>
+                      </m:r>
+                      <m:r>
+                        <a:rPr lang="en-AU" sz="3200" b="1" i="1" smtClean="0">
+                          <a:latin typeface="Cambria Math" panose="02040503050406030204" pitchFamily="18" charset="0"/>
+                        </a:rPr>
+                        <m:t>')(</m:t>
+                      </m:r>
+                      <m:r>
+                        <a:rPr lang="en-AU" sz="3200" b="1" i="1" smtClean="0">
+                          <a:latin typeface="Cambria Math" panose="02040503050406030204" pitchFamily="18" charset="0"/>
+                        </a:rPr>
+                        <m:t>𝒙</m:t>
+                      </m:r>
+                      <m:r>
+                        <a:rPr lang="en-AU" sz="3200" b="1" i="1" smtClean="0">
+                          <a:latin typeface="Cambria Math" panose="02040503050406030204" pitchFamily="18" charset="0"/>
+                        </a:rPr>
+                        <m:t>)</m:t>
                       </m:r>
                     </m:oMath>
                   </m:oMathPara>
                 </a14:m>
-                <a:endParaRPr lang="en-AU" sz="2800" b="1" dirty="0"/>
+                <a:endParaRPr lang="en-AU" b="1" dirty="0"/>
               </a:p>
             </p:txBody>
           </p:sp>
         </mc:Choice>
-        <mc:Fallback xmlns="">
+        <mc:Fallback>
           <p:sp>
             <p:nvSpPr>
               <p:cNvPr id="39" name="Rectangle: Rounded Corners 38">
@@ -5819,7 +5483,7 @@
                 <a:avLst/>
               </a:prstGeom>
               <a:blipFill>
-                <a:blip r:embed="rId8"/>
+                <a:blip r:embed="rId7"/>
                 <a:stretch>
                   <a:fillRect/>
                 </a:stretch>
@@ -7607,7 +7271,7 @@
             </a:r>
             <a:r>
               <a:rPr lang="en-US" sz="3000" dirty="0"/>
-              <a:t>unsafe code, concurrency, richer ownership patterns.</a:t>
+              <a:t>unsafe code, concurrency, nested and higher-order borrows, interior mutability.</a:t>
             </a:r>
             <a:endParaRPr lang="en-AU" sz="3000" dirty="0">
               <a:solidFill>
@@ -7835,6 +7499,209 @@
             <a:r>
               <a:rPr lang="en-US" sz="3000" i="1" dirty="0"/>
               <a:t>“Not just theory – A usable developer tool”</a:t>
+            </a:r>
+          </a:p>
+        </p:txBody>
+      </p:sp>
+      <p:sp>
+        <p:nvSpPr>
+          <p:cNvPr id="15" name="Rounded Rectangle 13">
+            <a:extLst>
+              <a:ext uri="{FF2B5EF4-FFF2-40B4-BE49-F238E27FC236}">
+                <a16:creationId xmlns:a16="http://schemas.microsoft.com/office/drawing/2014/main" id="{EC87D4E5-FB04-93D1-A91C-3029C16E4B18}"/>
+              </a:ext>
+            </a:extLst>
+          </p:cNvPr>
+          <p:cNvSpPr/>
+          <p:nvPr/>
+        </p:nvSpPr>
+        <p:spPr>
+          <a:xfrm>
+            <a:off x="24460097" y="20880000"/>
+            <a:ext cx="10560000" cy="1446600"/>
+          </a:xfrm>
+          <a:prstGeom prst="roundRect">
+            <a:avLst>
+              <a:gd name="adj" fmla="val 3409"/>
+            </a:avLst>
+          </a:prstGeom>
+          <a:solidFill>
+            <a:srgbClr val="FDFD96"/>
+          </a:solidFill>
+          <a:ln w="25400">
+            <a:solidFill>
+              <a:srgbClr val="000000"/>
+            </a:solidFill>
+          </a:ln>
+        </p:spPr>
+        <p:style>
+          <a:lnRef idx="1">
+            <a:schemeClr val="accent1"/>
+          </a:lnRef>
+          <a:fillRef idx="3">
+            <a:schemeClr val="accent1"/>
+          </a:fillRef>
+          <a:effectRef idx="2">
+            <a:schemeClr val="accent1"/>
+          </a:effectRef>
+          <a:fontRef idx="minor">
+            <a:schemeClr val="lt1"/>
+          </a:fontRef>
+        </p:style>
+        <p:txBody>
+          <a:bodyPr rtlCol="0" anchor="t"/>
+          <a:lstStyle/>
+          <a:p>
+            <a:pPr algn="ctr"/>
+            <a:endParaRPr lang="en-AU" dirty="0"/>
+          </a:p>
+          <a:p>
+            <a:pPr algn="ctr">
+              <a:defRPr sz="6000" b="1">
+                <a:solidFill>
+                  <a:srgbClr val="000000"/>
+                </a:solidFill>
+              </a:defRPr>
+            </a:pPr>
+            <a:r>
+              <a:rPr lang="en-AU" dirty="0"/>
+              <a:t>Examples</a:t>
+            </a:r>
+          </a:p>
+        </p:txBody>
+      </p:sp>
+      <p:sp>
+        <p:nvSpPr>
+          <p:cNvPr id="31" name="Rounded Rectangle 14">
+            <a:extLst>
+              <a:ext uri="{FF2B5EF4-FFF2-40B4-BE49-F238E27FC236}">
+                <a16:creationId xmlns:a16="http://schemas.microsoft.com/office/drawing/2014/main" id="{2ECBCBE6-4519-054A-33BB-4706DC02176F}"/>
+              </a:ext>
+            </a:extLst>
+          </p:cNvPr>
+          <p:cNvSpPr/>
+          <p:nvPr/>
+        </p:nvSpPr>
+        <p:spPr>
+          <a:xfrm>
+            <a:off x="24459835" y="22482382"/>
+            <a:ext cx="10560000" cy="5086606"/>
+          </a:xfrm>
+          <a:prstGeom prst="roundRect">
+            <a:avLst>
+              <a:gd name="adj" fmla="val 3409"/>
+            </a:avLst>
+          </a:prstGeom>
+          <a:solidFill>
+            <a:srgbClr val="FFFFFF"/>
+          </a:solidFill>
+          <a:ln w="19050">
+            <a:solidFill>
+              <a:srgbClr val="000000"/>
+            </a:solidFill>
+          </a:ln>
+        </p:spPr>
+        <p:style>
+          <a:lnRef idx="1">
+            <a:schemeClr val="accent1"/>
+          </a:lnRef>
+          <a:fillRef idx="3">
+            <a:schemeClr val="accent1"/>
+          </a:fillRef>
+          <a:effectRef idx="2">
+            <a:schemeClr val="accent1"/>
+          </a:effectRef>
+          <a:fontRef idx="minor">
+            <a:schemeClr val="lt1"/>
+          </a:fontRef>
+        </p:style>
+        <p:txBody>
+          <a:bodyPr rtlCol="0" anchor="t"/>
+          <a:lstStyle/>
+          <a:p>
+            <a:pPr marL="457200" indent="-457200" algn="ctr">
+              <a:buFont typeface="Arial" panose="020B0604020202020204" pitchFamily="34" charset="0"/>
+              <a:buChar char="•"/>
+            </a:pPr>
+            <a:endParaRPr lang="en-AU" sz="3000" dirty="0"/>
+          </a:p>
+          <a:p>
+            <a:pPr marL="457200" indent="-457200" algn="l">
+              <a:buFont typeface="Arial" panose="020B0604020202020204" pitchFamily="34" charset="0"/>
+              <a:buChar char="•"/>
+              <a:defRPr sz="3600">
+                <a:solidFill>
+                  <a:srgbClr val="000000"/>
+                </a:solidFill>
+              </a:defRPr>
+            </a:pPr>
+            <a:endParaRPr sz="3000" dirty="0"/>
+          </a:p>
+        </p:txBody>
+      </p:sp>
+      <p:sp>
+        <p:nvSpPr>
+          <p:cNvPr id="51" name="Rounded Rectangle 13">
+            <a:extLst>
+              <a:ext uri="{FF2B5EF4-FFF2-40B4-BE49-F238E27FC236}">
+                <a16:creationId xmlns:a16="http://schemas.microsoft.com/office/drawing/2014/main" id="{697FD253-68B2-DE02-C32B-19B04CC5DF53}"/>
+              </a:ext>
+            </a:extLst>
+          </p:cNvPr>
+          <p:cNvSpPr/>
+          <p:nvPr/>
+        </p:nvSpPr>
+        <p:spPr>
+          <a:xfrm>
+            <a:off x="24475633" y="27803400"/>
+            <a:ext cx="10560000" cy="1446600"/>
+          </a:xfrm>
+          <a:prstGeom prst="roundRect">
+            <a:avLst>
+              <a:gd name="adj" fmla="val 3409"/>
+            </a:avLst>
+          </a:prstGeom>
+          <a:solidFill>
+            <a:srgbClr val="FFE5B4"/>
+          </a:solidFill>
+          <a:ln w="25400">
+            <a:solidFill>
+              <a:srgbClr val="000000"/>
+            </a:solidFill>
+          </a:ln>
+        </p:spPr>
+        <p:style>
+          <a:lnRef idx="1">
+            <a:schemeClr val="accent1"/>
+          </a:lnRef>
+          <a:fillRef idx="3">
+            <a:schemeClr val="accent1"/>
+          </a:fillRef>
+          <a:effectRef idx="2">
+            <a:schemeClr val="accent1"/>
+          </a:effectRef>
+          <a:fontRef idx="minor">
+            <a:schemeClr val="lt1"/>
+          </a:fontRef>
+        </p:style>
+        <p:txBody>
+          <a:bodyPr rtlCol="0" anchor="t"/>
+          <a:lstStyle/>
+          <a:p>
+            <a:pPr algn="ctr"/>
+            <a:endParaRPr lang="en-AU" dirty="0"/>
+          </a:p>
+          <a:p>
+            <a:pPr algn="ctr">
+              <a:defRPr sz="6000" b="1">
+                <a:solidFill>
+                  <a:srgbClr val="000000"/>
+                </a:solidFill>
+              </a:defRPr>
+            </a:pPr>
+            <a:r>
+              <a:rPr lang="en-AU" dirty="0"/>
+              <a:t>Additional Work</a:t>
             </a:r>
           </a:p>
         </p:txBody>

</xml_diff>

<commit_message>
added examples to poster
</commit_message>
<xml_diff>
--- a/reports/splash_poster/working_copy.pptx
+++ b/reports/splash_poster/working_copy.pptx
@@ -5285,8 +5285,8 @@
           </a:p>
         </p:txBody>
       </p:sp>
-      <mc:AlternateContent xmlns:mc="http://schemas.openxmlformats.org/markup-compatibility/2006">
-        <mc:Choice xmlns:a14="http://schemas.microsoft.com/office/drawing/2010/main" Requires="a14">
+      <mc:AlternateContent xmlns:mc="http://schemas.openxmlformats.org/markup-compatibility/2006" xmlns:a14="http://schemas.microsoft.com/office/drawing/2010/main">
+        <mc:Choice Requires="a14">
           <p:sp>
             <p:nvSpPr>
               <p:cNvPr id="39" name="Rectangle: Rounded Corners 38">
@@ -5355,6 +5355,7 @@
                 <a:endParaRPr lang="en-AU" b="1" dirty="0"/>
               </a:p>
               <a:p>
+                <a:pPr/>
                 <a14:m>
                   <m:oMathPara xmlns:m="http://schemas.openxmlformats.org/officeDocument/2006/math">
                     <m:oMathParaPr>
@@ -5437,7 +5438,13 @@
                         <a:rPr lang="en-AU" sz="3200" b="1" i="1" smtClean="0">
                           <a:latin typeface="Cambria Math" panose="02040503050406030204" pitchFamily="18" charset="0"/>
                         </a:rPr>
-                        <m:t>')(</m:t>
+                        <m:t>′</m:t>
+                      </m:r>
+                      <m:r>
+                        <a:rPr lang="en-AU" sz="3200" b="1" i="1" smtClean="0">
+                          <a:latin typeface="Cambria Math" panose="02040503050406030204" pitchFamily="18" charset="0"/>
+                        </a:rPr>
+                        <m:t>)(</m:t>
                       </m:r>
                       <m:r>
                         <a:rPr lang="en-AU" sz="3200" b="1" i="1" smtClean="0">
@@ -5459,7 +5466,7 @@
             </p:txBody>
           </p:sp>
         </mc:Choice>
-        <mc:Fallback>
+        <mc:Fallback xmlns="">
           <p:sp>
             <p:nvSpPr>
               <p:cNvPr id="39" name="Rectangle: Rounded Corners 38">
@@ -7565,77 +7572,8 @@
             </a:pPr>
             <a:r>
               <a:rPr lang="en-AU" dirty="0"/>
-              <a:t>Examples</a:t>
-            </a:r>
-          </a:p>
-        </p:txBody>
-      </p:sp>
-      <p:sp>
-        <p:nvSpPr>
-          <p:cNvPr id="31" name="Rounded Rectangle 14">
-            <a:extLst>
-              <a:ext uri="{FF2B5EF4-FFF2-40B4-BE49-F238E27FC236}">
-                <a16:creationId xmlns:a16="http://schemas.microsoft.com/office/drawing/2014/main" id="{2ECBCBE6-4519-054A-33BB-4706DC02176F}"/>
-              </a:ext>
-            </a:extLst>
-          </p:cNvPr>
-          <p:cNvSpPr/>
-          <p:nvPr/>
-        </p:nvSpPr>
-        <p:spPr>
-          <a:xfrm>
-            <a:off x="24459835" y="22482382"/>
-            <a:ext cx="10560000" cy="5086606"/>
-          </a:xfrm>
-          <a:prstGeom prst="roundRect">
-            <a:avLst>
-              <a:gd name="adj" fmla="val 3409"/>
-            </a:avLst>
-          </a:prstGeom>
-          <a:solidFill>
-            <a:srgbClr val="FFFFFF"/>
-          </a:solidFill>
-          <a:ln w="19050">
-            <a:solidFill>
-              <a:srgbClr val="000000"/>
-            </a:solidFill>
-          </a:ln>
-        </p:spPr>
-        <p:style>
-          <a:lnRef idx="1">
-            <a:schemeClr val="accent1"/>
-          </a:lnRef>
-          <a:fillRef idx="3">
-            <a:schemeClr val="accent1"/>
-          </a:fillRef>
-          <a:effectRef idx="2">
-            <a:schemeClr val="accent1"/>
-          </a:effectRef>
-          <a:fontRef idx="minor">
-            <a:schemeClr val="lt1"/>
-          </a:fontRef>
-        </p:style>
-        <p:txBody>
-          <a:bodyPr rtlCol="0" anchor="t"/>
-          <a:lstStyle/>
-          <a:p>
-            <a:pPr marL="457200" indent="-457200" algn="ctr">
-              <a:buFont typeface="Arial" panose="020B0604020202020204" pitchFamily="34" charset="0"/>
-              <a:buChar char="•"/>
-            </a:pPr>
-            <a:endParaRPr lang="en-AU" sz="3000" dirty="0"/>
-          </a:p>
-          <a:p>
-            <a:pPr marL="457200" indent="-457200" algn="l">
-              <a:buFont typeface="Arial" panose="020B0604020202020204" pitchFamily="34" charset="0"/>
-              <a:buChar char="•"/>
-              <a:defRPr sz="3600">
-                <a:solidFill>
-                  <a:srgbClr val="000000"/>
-                </a:solidFill>
-              </a:defRPr>
-            </a:pPr>
-            <a:endParaRPr sz="3000" dirty="0"/>
+              <a:t>Rust → Coq Translation</a:t>
+            </a:r>
           </a:p>
         </p:txBody>
       </p:sp>
@@ -7706,6 +7644,38 @@
           </a:p>
         </p:txBody>
       </p:sp>
+      <p:pic>
+        <p:nvPicPr>
+          <p:cNvPr id="72" name="Picture 71">
+            <a:extLst>
+              <a:ext uri="{FF2B5EF4-FFF2-40B4-BE49-F238E27FC236}">
+                <a16:creationId xmlns:a16="http://schemas.microsoft.com/office/drawing/2014/main" id="{24C9979E-0367-6902-A69C-52D7B4CACE1A}"/>
+              </a:ext>
+            </a:extLst>
+          </p:cNvPr>
+          <p:cNvPicPr>
+            <a:picLocks noChangeAspect="1"/>
+          </p:cNvPicPr>
+          <p:nvPr/>
+        </p:nvPicPr>
+        <p:blipFill>
+          <a:blip r:embed="rId8"/>
+          <a:stretch>
+            <a:fillRect/>
+          </a:stretch>
+        </p:blipFill>
+        <p:spPr>
+          <a:xfrm>
+            <a:off x="24432398" y="22482382"/>
+            <a:ext cx="10603236" cy="5080081"/>
+          </a:xfrm>
+          <a:prstGeom prst="roundRect">
+            <a:avLst>
+              <a:gd name="adj" fmla="val 4217"/>
+            </a:avLst>
+          </a:prstGeom>
+        </p:spPr>
+      </p:pic>
     </p:spTree>
   </p:cSld>
   <p:clrMapOvr>

</xml_diff>